<commit_message>
Updated documentation | Removed redundant statements
</commit_message>
<xml_diff>
--- a/Scheme/Scheme.pptx
+++ b/Scheme/Scheme.pptx
@@ -5,13 +5,16 @@
     <p:sldMasterId id="2147483660" r:id="rId1"/>
   </p:sldMasterIdLst>
   <p:notesMasterIdLst>
-    <p:notesMasterId r:id="rId6"/>
+    <p:notesMasterId r:id="rId9"/>
   </p:notesMasterIdLst>
   <p:sldIdLst>
     <p:sldId id="256" r:id="rId2"/>
     <p:sldId id="257" r:id="rId3"/>
     <p:sldId id="258" r:id="rId4"/>
     <p:sldId id="259" r:id="rId5"/>
+    <p:sldId id="260" r:id="rId6"/>
+    <p:sldId id="261" r:id="rId7"/>
+    <p:sldId id="263" r:id="rId8"/>
   </p:sldIdLst>
   <p:sldSz cx="9144000" cy="6858000" type="screen4x3"/>
   <p:notesSz cx="6858000" cy="9144000"/>
@@ -200,7 +203,7 @@
           <a:p>
             <a:fld id="{5DE9CCF9-CE14-4118-B675-AC72CDF038E6}" type="datetimeFigureOut">
               <a:rPr lang="en-US" smtClean="0"/>
-              <a:t>4/13/2019</a:t>
+              <a:t>4/14/2019</a:t>
             </a:fld>
             <a:endParaRPr lang="en-US"/>
           </a:p>
@@ -599,7 +602,7 @@
           <a:p>
             <a:fld id="{6149BA01-7448-4321-80DC-7E91E834C80B}" type="datetimeFigureOut">
               <a:rPr lang="en-US" smtClean="0"/>
-              <a:t>4/13/2019</a:t>
+              <a:t>4/14/2019</a:t>
             </a:fld>
             <a:endParaRPr lang="en-US"/>
           </a:p>
@@ -769,7 +772,7 @@
           <a:p>
             <a:fld id="{6149BA01-7448-4321-80DC-7E91E834C80B}" type="datetimeFigureOut">
               <a:rPr lang="en-US" smtClean="0"/>
-              <a:t>4/13/2019</a:t>
+              <a:t>4/14/2019</a:t>
             </a:fld>
             <a:endParaRPr lang="en-US"/>
           </a:p>
@@ -949,7 +952,7 @@
           <a:p>
             <a:fld id="{6149BA01-7448-4321-80DC-7E91E834C80B}" type="datetimeFigureOut">
               <a:rPr lang="en-US" smtClean="0"/>
-              <a:t>4/13/2019</a:t>
+              <a:t>4/14/2019</a:t>
             </a:fld>
             <a:endParaRPr lang="en-US"/>
           </a:p>
@@ -1119,7 +1122,7 @@
           <a:p>
             <a:fld id="{6149BA01-7448-4321-80DC-7E91E834C80B}" type="datetimeFigureOut">
               <a:rPr lang="en-US" smtClean="0"/>
-              <a:t>4/13/2019</a:t>
+              <a:t>4/14/2019</a:t>
             </a:fld>
             <a:endParaRPr lang="en-US"/>
           </a:p>
@@ -1363,7 +1366,7 @@
           <a:p>
             <a:fld id="{6149BA01-7448-4321-80DC-7E91E834C80B}" type="datetimeFigureOut">
               <a:rPr lang="en-US" smtClean="0"/>
-              <a:t>4/13/2019</a:t>
+              <a:t>4/14/2019</a:t>
             </a:fld>
             <a:endParaRPr lang="en-US"/>
           </a:p>
@@ -1595,7 +1598,7 @@
           <a:p>
             <a:fld id="{6149BA01-7448-4321-80DC-7E91E834C80B}" type="datetimeFigureOut">
               <a:rPr lang="en-US" smtClean="0"/>
-              <a:t>4/13/2019</a:t>
+              <a:t>4/14/2019</a:t>
             </a:fld>
             <a:endParaRPr lang="en-US"/>
           </a:p>
@@ -1962,7 +1965,7 @@
           <a:p>
             <a:fld id="{6149BA01-7448-4321-80DC-7E91E834C80B}" type="datetimeFigureOut">
               <a:rPr lang="en-US" smtClean="0"/>
-              <a:t>4/13/2019</a:t>
+              <a:t>4/14/2019</a:t>
             </a:fld>
             <a:endParaRPr lang="en-US"/>
           </a:p>
@@ -2080,7 +2083,7 @@
           <a:p>
             <a:fld id="{6149BA01-7448-4321-80DC-7E91E834C80B}" type="datetimeFigureOut">
               <a:rPr lang="en-US" smtClean="0"/>
-              <a:t>4/13/2019</a:t>
+              <a:t>4/14/2019</a:t>
             </a:fld>
             <a:endParaRPr lang="en-US"/>
           </a:p>
@@ -2175,7 +2178,7 @@
           <a:p>
             <a:fld id="{6149BA01-7448-4321-80DC-7E91E834C80B}" type="datetimeFigureOut">
               <a:rPr lang="en-US" smtClean="0"/>
-              <a:t>4/13/2019</a:t>
+              <a:t>4/14/2019</a:t>
             </a:fld>
             <a:endParaRPr lang="en-US"/>
           </a:p>
@@ -2452,7 +2455,7 @@
           <a:p>
             <a:fld id="{6149BA01-7448-4321-80DC-7E91E834C80B}" type="datetimeFigureOut">
               <a:rPr lang="en-US" smtClean="0"/>
-              <a:t>4/13/2019</a:t>
+              <a:t>4/14/2019</a:t>
             </a:fld>
             <a:endParaRPr lang="en-US"/>
           </a:p>
@@ -2709,7 +2712,7 @@
           <a:p>
             <a:fld id="{6149BA01-7448-4321-80DC-7E91E834C80B}" type="datetimeFigureOut">
               <a:rPr lang="en-US" smtClean="0"/>
-              <a:t>4/13/2019</a:t>
+              <a:t>4/14/2019</a:t>
             </a:fld>
             <a:endParaRPr lang="en-US"/>
           </a:p>
@@ -2922,7 +2925,7 @@
           <a:p>
             <a:fld id="{6149BA01-7448-4321-80DC-7E91E834C80B}" type="datetimeFigureOut">
               <a:rPr lang="en-US" smtClean="0"/>
-              <a:t>4/13/2019</a:t>
+              <a:t>4/14/2019</a:t>
             </a:fld>
             <a:endParaRPr lang="en-US"/>
           </a:p>
@@ -16933,6 +16936,2707 @@
     <p:extLst>
       <p:ext uri="{BB962C8B-B14F-4D97-AF65-F5344CB8AC3E}">
         <p14:creationId xmlns:p14="http://schemas.microsoft.com/office/powerpoint/2010/main" val="3208586159"/>
+      </p:ext>
+    </p:extLst>
+  </p:cSld>
+  <p:clrMapOvr>
+    <a:masterClrMapping/>
+  </p:clrMapOvr>
+</p:sld>
+</file>
+
+<file path=ppt/slides/slide5.xml><?xml version="1.0" encoding="utf-8"?>
+<p:sld xmlns:a="http://schemas.openxmlformats.org/drawingml/2006/main" xmlns:r="http://schemas.openxmlformats.org/officeDocument/2006/relationships" xmlns:p="http://schemas.openxmlformats.org/presentationml/2006/main">
+  <p:cSld>
+    <p:spTree>
+      <p:nvGrpSpPr>
+        <p:cNvPr id="1" name=""/>
+        <p:cNvGrpSpPr/>
+        <p:nvPr/>
+      </p:nvGrpSpPr>
+      <p:grpSpPr>
+        <a:xfrm>
+          <a:off x="0" y="0"/>
+          <a:ext cx="0" cy="0"/>
+          <a:chOff x="0" y="0"/>
+          <a:chExt cx="0" cy="0"/>
+        </a:xfrm>
+      </p:grpSpPr>
+      <p:sp>
+        <p:nvSpPr>
+          <p:cNvPr id="2" name="Rectangle 1"/>
+          <p:cNvSpPr/>
+          <p:nvPr/>
+        </p:nvSpPr>
+        <p:spPr>
+          <a:xfrm>
+            <a:off x="3125585" y="1712422"/>
+            <a:ext cx="1512000" cy="1512000"/>
+          </a:xfrm>
+          <a:prstGeom prst="rect">
+            <a:avLst/>
+          </a:prstGeom>
+          <a:solidFill>
+            <a:schemeClr val="bg1"/>
+          </a:solidFill>
+          <a:ln w="22225">
+            <a:solidFill>
+              <a:schemeClr val="tx1"/>
+            </a:solidFill>
+          </a:ln>
+        </p:spPr>
+        <p:style>
+          <a:lnRef idx="2">
+            <a:schemeClr val="accent1">
+              <a:shade val="50000"/>
+            </a:schemeClr>
+          </a:lnRef>
+          <a:fillRef idx="1">
+            <a:schemeClr val="accent1"/>
+          </a:fillRef>
+          <a:effectRef idx="0">
+            <a:schemeClr val="accent1"/>
+          </a:effectRef>
+          <a:fontRef idx="minor">
+            <a:schemeClr val="lt1"/>
+          </a:fontRef>
+        </p:style>
+        <p:txBody>
+          <a:bodyPr rtlCol="0" anchor="ctr"/>
+          <a:lstStyle/>
+          <a:p>
+            <a:pPr algn="ctr"/>
+            <a:r>
+              <a:rPr lang="ro-MD" dirty="0" smtClean="0">
+                <a:solidFill>
+                  <a:schemeClr val="tx1"/>
+                </a:solidFill>
+                <a:latin typeface="Consolas" panose="020B0609020204030204" pitchFamily="49" charset="0"/>
+              </a:rPr>
+              <a:t>$2000</a:t>
+            </a:r>
+            <a:endParaRPr lang="en-US" dirty="0">
+              <a:solidFill>
+                <a:schemeClr val="tx1"/>
+              </a:solidFill>
+              <a:latin typeface="Consolas" panose="020B0609020204030204" pitchFamily="49" charset="0"/>
+            </a:endParaRPr>
+          </a:p>
+        </p:txBody>
+      </p:sp>
+      <p:sp>
+        <p:nvSpPr>
+          <p:cNvPr id="3" name="Rectangle 2"/>
+          <p:cNvSpPr/>
+          <p:nvPr/>
+        </p:nvSpPr>
+        <p:spPr>
+          <a:xfrm>
+            <a:off x="3125585" y="3228677"/>
+            <a:ext cx="1512000" cy="1512000"/>
+          </a:xfrm>
+          <a:prstGeom prst="rect">
+            <a:avLst/>
+          </a:prstGeom>
+          <a:solidFill>
+            <a:schemeClr val="bg1"/>
+          </a:solidFill>
+          <a:ln w="22225">
+            <a:solidFill>
+              <a:schemeClr val="tx1"/>
+            </a:solidFill>
+          </a:ln>
+        </p:spPr>
+        <p:style>
+          <a:lnRef idx="2">
+            <a:schemeClr val="accent1">
+              <a:shade val="50000"/>
+            </a:schemeClr>
+          </a:lnRef>
+          <a:fillRef idx="1">
+            <a:schemeClr val="accent1"/>
+          </a:fillRef>
+          <a:effectRef idx="0">
+            <a:schemeClr val="accent1"/>
+          </a:effectRef>
+          <a:fontRef idx="minor">
+            <a:schemeClr val="lt1"/>
+          </a:fontRef>
+        </p:style>
+        <p:txBody>
+          <a:bodyPr rtlCol="0" anchor="ctr"/>
+          <a:lstStyle/>
+          <a:p>
+            <a:pPr algn="ctr"/>
+            <a:r>
+              <a:rPr lang="ro-MD" dirty="0">
+                <a:solidFill>
+                  <a:schemeClr val="tx1"/>
+                </a:solidFill>
+                <a:latin typeface="Consolas" panose="020B0609020204030204" pitchFamily="49" charset="0"/>
+              </a:rPr>
+              <a:t>$</a:t>
+            </a:r>
+            <a:r>
+              <a:rPr lang="ro-MD" dirty="0" smtClean="0">
+                <a:solidFill>
+                  <a:schemeClr val="tx1"/>
+                </a:solidFill>
+                <a:latin typeface="Consolas" panose="020B0609020204030204" pitchFamily="49" charset="0"/>
+              </a:rPr>
+              <a:t>2800</a:t>
+            </a:r>
+            <a:endParaRPr lang="en-US" dirty="0"/>
+          </a:p>
+        </p:txBody>
+      </p:sp>
+      <p:sp>
+        <p:nvSpPr>
+          <p:cNvPr id="4" name="Rectangle 3"/>
+          <p:cNvSpPr/>
+          <p:nvPr/>
+        </p:nvSpPr>
+        <p:spPr>
+          <a:xfrm>
+            <a:off x="4637585" y="1712422"/>
+            <a:ext cx="1512000" cy="1512000"/>
+          </a:xfrm>
+          <a:prstGeom prst="rect">
+            <a:avLst/>
+          </a:prstGeom>
+          <a:solidFill>
+            <a:schemeClr val="bg1"/>
+          </a:solidFill>
+          <a:ln w="22225">
+            <a:solidFill>
+              <a:schemeClr val="tx1"/>
+            </a:solidFill>
+          </a:ln>
+        </p:spPr>
+        <p:style>
+          <a:lnRef idx="2">
+            <a:schemeClr val="accent1">
+              <a:shade val="50000"/>
+            </a:schemeClr>
+          </a:lnRef>
+          <a:fillRef idx="1">
+            <a:schemeClr val="accent1"/>
+          </a:fillRef>
+          <a:effectRef idx="0">
+            <a:schemeClr val="accent1"/>
+          </a:effectRef>
+          <a:fontRef idx="minor">
+            <a:schemeClr val="lt1"/>
+          </a:fontRef>
+        </p:style>
+        <p:txBody>
+          <a:bodyPr rtlCol="0" anchor="ctr"/>
+          <a:lstStyle/>
+          <a:p>
+            <a:pPr algn="ctr"/>
+            <a:r>
+              <a:rPr lang="ro-MD" dirty="0">
+                <a:solidFill>
+                  <a:schemeClr val="tx1"/>
+                </a:solidFill>
+                <a:latin typeface="Consolas" panose="020B0609020204030204" pitchFamily="49" charset="0"/>
+              </a:rPr>
+              <a:t>$</a:t>
+            </a:r>
+            <a:r>
+              <a:rPr lang="ro-MD" dirty="0" smtClean="0">
+                <a:solidFill>
+                  <a:schemeClr val="tx1"/>
+                </a:solidFill>
+                <a:latin typeface="Consolas" panose="020B0609020204030204" pitchFamily="49" charset="0"/>
+              </a:rPr>
+              <a:t>2400</a:t>
+            </a:r>
+            <a:endParaRPr lang="en-US" dirty="0">
+              <a:solidFill>
+                <a:schemeClr val="tx1"/>
+              </a:solidFill>
+              <a:latin typeface="Consolas" panose="020B0609020204030204" pitchFamily="49" charset="0"/>
+            </a:endParaRPr>
+          </a:p>
+        </p:txBody>
+      </p:sp>
+      <p:sp>
+        <p:nvSpPr>
+          <p:cNvPr id="5" name="Rectangle 4"/>
+          <p:cNvSpPr/>
+          <p:nvPr/>
+        </p:nvSpPr>
+        <p:spPr>
+          <a:xfrm>
+            <a:off x="4637585" y="3228677"/>
+            <a:ext cx="1512000" cy="1512000"/>
+          </a:xfrm>
+          <a:prstGeom prst="rect">
+            <a:avLst/>
+          </a:prstGeom>
+          <a:solidFill>
+            <a:schemeClr val="bg1"/>
+          </a:solidFill>
+          <a:ln w="22225">
+            <a:solidFill>
+              <a:schemeClr val="tx1"/>
+            </a:solidFill>
+          </a:ln>
+        </p:spPr>
+        <p:style>
+          <a:lnRef idx="2">
+            <a:schemeClr val="accent1">
+              <a:shade val="50000"/>
+            </a:schemeClr>
+          </a:lnRef>
+          <a:fillRef idx="1">
+            <a:schemeClr val="accent1"/>
+          </a:fillRef>
+          <a:effectRef idx="0">
+            <a:schemeClr val="accent1"/>
+          </a:effectRef>
+          <a:fontRef idx="minor">
+            <a:schemeClr val="lt1"/>
+          </a:fontRef>
+        </p:style>
+        <p:txBody>
+          <a:bodyPr rtlCol="0" anchor="ctr"/>
+          <a:lstStyle/>
+          <a:p>
+            <a:pPr algn="ctr"/>
+            <a:r>
+              <a:rPr lang="ro-MD" dirty="0">
+                <a:solidFill>
+                  <a:schemeClr val="tx1"/>
+                </a:solidFill>
+                <a:latin typeface="Consolas" panose="020B0609020204030204" pitchFamily="49" charset="0"/>
+              </a:rPr>
+              <a:t>$</a:t>
+            </a:r>
+            <a:r>
+              <a:rPr lang="ro-MD" dirty="0" smtClean="0">
+                <a:solidFill>
+                  <a:schemeClr val="tx1"/>
+                </a:solidFill>
+                <a:latin typeface="Consolas" panose="020B0609020204030204" pitchFamily="49" charset="0"/>
+              </a:rPr>
+              <a:t>2C00</a:t>
+            </a:r>
+            <a:endParaRPr lang="en-US" dirty="0"/>
+          </a:p>
+        </p:txBody>
+      </p:sp>
+      <p:sp>
+        <p:nvSpPr>
+          <p:cNvPr id="12" name="Half Frame 11"/>
+          <p:cNvSpPr/>
+          <p:nvPr/>
+        </p:nvSpPr>
+        <p:spPr>
+          <a:xfrm rot="10800000">
+            <a:off x="3089585" y="1677206"/>
+            <a:ext cx="36000" cy="36000"/>
+          </a:xfrm>
+          <a:prstGeom prst="halfFrame">
+            <a:avLst>
+              <a:gd name="adj1" fmla="val 0"/>
+              <a:gd name="adj2" fmla="val 0"/>
+            </a:avLst>
+          </a:prstGeom>
+          <a:solidFill>
+            <a:schemeClr val="tx1"/>
+          </a:solidFill>
+          <a:ln>
+            <a:solidFill>
+              <a:schemeClr val="tx1"/>
+            </a:solidFill>
+          </a:ln>
+        </p:spPr>
+        <p:style>
+          <a:lnRef idx="2">
+            <a:schemeClr val="accent1">
+              <a:shade val="50000"/>
+            </a:schemeClr>
+          </a:lnRef>
+          <a:fillRef idx="1">
+            <a:schemeClr val="accent1"/>
+          </a:fillRef>
+          <a:effectRef idx="0">
+            <a:schemeClr val="accent1"/>
+          </a:effectRef>
+          <a:fontRef idx="minor">
+            <a:schemeClr val="lt1"/>
+          </a:fontRef>
+        </p:style>
+        <p:txBody>
+          <a:bodyPr rtlCol="0" anchor="ctr"/>
+          <a:lstStyle/>
+          <a:p>
+            <a:pPr algn="ctr"/>
+            <a:endParaRPr lang="en-US">
+              <a:solidFill>
+                <a:schemeClr val="tx1"/>
+              </a:solidFill>
+            </a:endParaRPr>
+          </a:p>
+        </p:txBody>
+      </p:sp>
+      <p:sp>
+        <p:nvSpPr>
+          <p:cNvPr id="13" name="Half Frame 12"/>
+          <p:cNvSpPr/>
+          <p:nvPr/>
+        </p:nvSpPr>
+        <p:spPr>
+          <a:xfrm rot="5400000">
+            <a:off x="3089585" y="4740677"/>
+            <a:ext cx="36000" cy="36000"/>
+          </a:xfrm>
+          <a:prstGeom prst="halfFrame">
+            <a:avLst>
+              <a:gd name="adj1" fmla="val 0"/>
+              <a:gd name="adj2" fmla="val 0"/>
+            </a:avLst>
+          </a:prstGeom>
+          <a:solidFill>
+            <a:schemeClr val="tx1"/>
+          </a:solidFill>
+          <a:ln>
+            <a:solidFill>
+              <a:schemeClr val="tx1"/>
+            </a:solidFill>
+          </a:ln>
+        </p:spPr>
+        <p:style>
+          <a:lnRef idx="2">
+            <a:schemeClr val="accent1">
+              <a:shade val="50000"/>
+            </a:schemeClr>
+          </a:lnRef>
+          <a:fillRef idx="1">
+            <a:schemeClr val="accent1"/>
+          </a:fillRef>
+          <a:effectRef idx="0">
+            <a:schemeClr val="accent1"/>
+          </a:effectRef>
+          <a:fontRef idx="minor">
+            <a:schemeClr val="lt1"/>
+          </a:fontRef>
+        </p:style>
+        <p:txBody>
+          <a:bodyPr rtlCol="0" anchor="ctr"/>
+          <a:lstStyle/>
+          <a:p>
+            <a:pPr algn="ctr"/>
+            <a:endParaRPr lang="en-US">
+              <a:solidFill>
+                <a:schemeClr val="tx1"/>
+              </a:solidFill>
+            </a:endParaRPr>
+          </a:p>
+        </p:txBody>
+      </p:sp>
+      <p:sp>
+        <p:nvSpPr>
+          <p:cNvPr id="14" name="Half Frame 13"/>
+          <p:cNvSpPr/>
+          <p:nvPr/>
+        </p:nvSpPr>
+        <p:spPr>
+          <a:xfrm rot="16200000">
+            <a:off x="6149585" y="1677206"/>
+            <a:ext cx="36000" cy="36000"/>
+          </a:xfrm>
+          <a:prstGeom prst="halfFrame">
+            <a:avLst>
+              <a:gd name="adj1" fmla="val 0"/>
+              <a:gd name="adj2" fmla="val 0"/>
+            </a:avLst>
+          </a:prstGeom>
+          <a:solidFill>
+            <a:schemeClr val="tx1"/>
+          </a:solidFill>
+          <a:ln>
+            <a:solidFill>
+              <a:schemeClr val="tx1"/>
+            </a:solidFill>
+          </a:ln>
+        </p:spPr>
+        <p:style>
+          <a:lnRef idx="2">
+            <a:schemeClr val="accent1">
+              <a:shade val="50000"/>
+            </a:schemeClr>
+          </a:lnRef>
+          <a:fillRef idx="1">
+            <a:schemeClr val="accent1"/>
+          </a:fillRef>
+          <a:effectRef idx="0">
+            <a:schemeClr val="accent1"/>
+          </a:effectRef>
+          <a:fontRef idx="minor">
+            <a:schemeClr val="lt1"/>
+          </a:fontRef>
+        </p:style>
+        <p:txBody>
+          <a:bodyPr rtlCol="0" anchor="ctr"/>
+          <a:lstStyle/>
+          <a:p>
+            <a:pPr algn="ctr"/>
+            <a:endParaRPr lang="en-US">
+              <a:solidFill>
+                <a:schemeClr val="tx1"/>
+              </a:solidFill>
+            </a:endParaRPr>
+          </a:p>
+        </p:txBody>
+      </p:sp>
+      <p:sp>
+        <p:nvSpPr>
+          <p:cNvPr id="15" name="Half Frame 14"/>
+          <p:cNvSpPr/>
+          <p:nvPr/>
+        </p:nvSpPr>
+        <p:spPr>
+          <a:xfrm>
+            <a:off x="6149585" y="4740677"/>
+            <a:ext cx="36000" cy="36000"/>
+          </a:xfrm>
+          <a:prstGeom prst="halfFrame">
+            <a:avLst>
+              <a:gd name="adj1" fmla="val 0"/>
+              <a:gd name="adj2" fmla="val 0"/>
+            </a:avLst>
+          </a:prstGeom>
+          <a:solidFill>
+            <a:schemeClr val="tx1"/>
+          </a:solidFill>
+          <a:ln>
+            <a:solidFill>
+              <a:schemeClr val="tx1"/>
+            </a:solidFill>
+          </a:ln>
+        </p:spPr>
+        <p:style>
+          <a:lnRef idx="2">
+            <a:schemeClr val="accent1">
+              <a:shade val="50000"/>
+            </a:schemeClr>
+          </a:lnRef>
+          <a:fillRef idx="1">
+            <a:schemeClr val="accent1"/>
+          </a:fillRef>
+          <a:effectRef idx="0">
+            <a:schemeClr val="accent1"/>
+          </a:effectRef>
+          <a:fontRef idx="minor">
+            <a:schemeClr val="lt1"/>
+          </a:fontRef>
+        </p:style>
+        <p:txBody>
+          <a:bodyPr rtlCol="0" anchor="ctr"/>
+          <a:lstStyle/>
+          <a:p>
+            <a:pPr algn="ctr"/>
+            <a:endParaRPr lang="en-US">
+              <a:solidFill>
+                <a:schemeClr val="tx1"/>
+              </a:solidFill>
+            </a:endParaRPr>
+          </a:p>
+        </p:txBody>
+      </p:sp>
+      <p:sp>
+        <p:nvSpPr>
+          <p:cNvPr id="16" name="TextBox 15"/>
+          <p:cNvSpPr txBox="1"/>
+          <p:nvPr/>
+        </p:nvSpPr>
+        <p:spPr>
+          <a:xfrm>
+            <a:off x="2705100" y="1454207"/>
+            <a:ext cx="473206" cy="276999"/>
+          </a:xfrm>
+          <a:prstGeom prst="rect">
+            <a:avLst/>
+          </a:prstGeom>
+          <a:noFill/>
+        </p:spPr>
+        <p:txBody>
+          <a:bodyPr wrap="none" rtlCol="0">
+            <a:spAutoFit/>
+          </a:bodyPr>
+          <a:lstStyle/>
+          <a:p>
+            <a:r>
+              <a:rPr lang="ro-MD" sz="1200" dirty="0" smtClean="0"/>
+              <a:t>(0,0)</a:t>
+            </a:r>
+            <a:endParaRPr lang="en-US" sz="1200" dirty="0"/>
+          </a:p>
+        </p:txBody>
+      </p:sp>
+      <p:sp>
+        <p:nvSpPr>
+          <p:cNvPr id="17" name="TextBox 16"/>
+          <p:cNvSpPr txBox="1"/>
+          <p:nvPr/>
+        </p:nvSpPr>
+        <p:spPr>
+          <a:xfrm>
+            <a:off x="4269713" y="1431168"/>
+            <a:ext cx="630301" cy="276999"/>
+          </a:xfrm>
+          <a:prstGeom prst="rect">
+            <a:avLst/>
+          </a:prstGeom>
+          <a:noFill/>
+        </p:spPr>
+        <p:txBody>
+          <a:bodyPr wrap="none" rtlCol="0">
+            <a:spAutoFit/>
+          </a:bodyPr>
+          <a:lstStyle/>
+          <a:p>
+            <a:r>
+              <a:rPr lang="ro-MD" sz="1200" dirty="0" smtClean="0"/>
+              <a:t>(256,0)</a:t>
+            </a:r>
+            <a:endParaRPr lang="en-US" sz="1200" dirty="0"/>
+          </a:p>
+        </p:txBody>
+      </p:sp>
+      <p:sp>
+        <p:nvSpPr>
+          <p:cNvPr id="18" name="TextBox 17"/>
+          <p:cNvSpPr txBox="1"/>
+          <p:nvPr/>
+        </p:nvSpPr>
+        <p:spPr>
+          <a:xfrm>
+            <a:off x="6081185" y="1454207"/>
+            <a:ext cx="630301" cy="276999"/>
+          </a:xfrm>
+          <a:prstGeom prst="rect">
+            <a:avLst/>
+          </a:prstGeom>
+          <a:noFill/>
+        </p:spPr>
+        <p:txBody>
+          <a:bodyPr wrap="none" rtlCol="0">
+            <a:spAutoFit/>
+          </a:bodyPr>
+          <a:lstStyle/>
+          <a:p>
+            <a:r>
+              <a:rPr lang="ro-MD" sz="1200" dirty="0" smtClean="0"/>
+              <a:t>(511,0)</a:t>
+            </a:r>
+            <a:endParaRPr lang="en-US" sz="1200" dirty="0"/>
+          </a:p>
+        </p:txBody>
+      </p:sp>
+      <p:sp>
+        <p:nvSpPr>
+          <p:cNvPr id="19" name="TextBox 18"/>
+          <p:cNvSpPr txBox="1"/>
+          <p:nvPr/>
+        </p:nvSpPr>
+        <p:spPr>
+          <a:xfrm>
+            <a:off x="2548005" y="3085922"/>
+            <a:ext cx="630301" cy="276999"/>
+          </a:xfrm>
+          <a:prstGeom prst="rect">
+            <a:avLst/>
+          </a:prstGeom>
+          <a:noFill/>
+        </p:spPr>
+        <p:txBody>
+          <a:bodyPr wrap="none" rtlCol="0">
+            <a:spAutoFit/>
+          </a:bodyPr>
+          <a:lstStyle/>
+          <a:p>
+            <a:r>
+              <a:rPr lang="ro-MD" sz="1200" dirty="0" smtClean="0"/>
+              <a:t>(0,240)</a:t>
+            </a:r>
+            <a:endParaRPr lang="en-US" sz="1200" dirty="0"/>
+          </a:p>
+        </p:txBody>
+      </p:sp>
+      <p:sp>
+        <p:nvSpPr>
+          <p:cNvPr id="20" name="TextBox 19"/>
+          <p:cNvSpPr txBox="1"/>
+          <p:nvPr/>
+        </p:nvSpPr>
+        <p:spPr>
+          <a:xfrm>
+            <a:off x="2554355" y="4717637"/>
+            <a:ext cx="630301" cy="276999"/>
+          </a:xfrm>
+          <a:prstGeom prst="rect">
+            <a:avLst/>
+          </a:prstGeom>
+          <a:noFill/>
+        </p:spPr>
+        <p:txBody>
+          <a:bodyPr wrap="none" rtlCol="0">
+            <a:spAutoFit/>
+          </a:bodyPr>
+          <a:lstStyle/>
+          <a:p>
+            <a:r>
+              <a:rPr lang="ro-MD" sz="1200" dirty="0" smtClean="0"/>
+              <a:t>(0,479)</a:t>
+            </a:r>
+            <a:endParaRPr lang="en-US" sz="1200" dirty="0"/>
+          </a:p>
+        </p:txBody>
+      </p:sp>
+      <p:sp>
+        <p:nvSpPr>
+          <p:cNvPr id="21" name="TextBox 20"/>
+          <p:cNvSpPr txBox="1"/>
+          <p:nvPr/>
+        </p:nvSpPr>
+        <p:spPr>
+          <a:xfrm>
+            <a:off x="4250237" y="4717636"/>
+            <a:ext cx="787395" cy="276999"/>
+          </a:xfrm>
+          <a:prstGeom prst="rect">
+            <a:avLst/>
+          </a:prstGeom>
+          <a:noFill/>
+        </p:spPr>
+        <p:txBody>
+          <a:bodyPr wrap="none" rtlCol="0">
+            <a:spAutoFit/>
+          </a:bodyPr>
+          <a:lstStyle/>
+          <a:p>
+            <a:r>
+              <a:rPr lang="ro-MD" sz="1200" dirty="0" smtClean="0"/>
+              <a:t>(256,479)</a:t>
+            </a:r>
+            <a:endParaRPr lang="en-US" sz="1200" dirty="0"/>
+          </a:p>
+        </p:txBody>
+      </p:sp>
+      <p:sp>
+        <p:nvSpPr>
+          <p:cNvPr id="22" name="TextBox 21"/>
+          <p:cNvSpPr txBox="1"/>
+          <p:nvPr/>
+        </p:nvSpPr>
+        <p:spPr>
+          <a:xfrm>
+            <a:off x="6096864" y="3085921"/>
+            <a:ext cx="787395" cy="276999"/>
+          </a:xfrm>
+          <a:prstGeom prst="rect">
+            <a:avLst/>
+          </a:prstGeom>
+          <a:noFill/>
+        </p:spPr>
+        <p:txBody>
+          <a:bodyPr wrap="none" rtlCol="0">
+            <a:spAutoFit/>
+          </a:bodyPr>
+          <a:lstStyle/>
+          <a:p>
+            <a:r>
+              <a:rPr lang="ro-MD" sz="1200" dirty="0" smtClean="0"/>
+              <a:t>(511,240)</a:t>
+            </a:r>
+            <a:endParaRPr lang="en-US" sz="1200" dirty="0"/>
+          </a:p>
+        </p:txBody>
+      </p:sp>
+      <p:sp>
+        <p:nvSpPr>
+          <p:cNvPr id="23" name="TextBox 22"/>
+          <p:cNvSpPr txBox="1"/>
+          <p:nvPr/>
+        </p:nvSpPr>
+        <p:spPr>
+          <a:xfrm>
+            <a:off x="6081185" y="4721192"/>
+            <a:ext cx="787395" cy="276999"/>
+          </a:xfrm>
+          <a:prstGeom prst="rect">
+            <a:avLst/>
+          </a:prstGeom>
+          <a:noFill/>
+        </p:spPr>
+        <p:txBody>
+          <a:bodyPr wrap="none" rtlCol="0">
+            <a:spAutoFit/>
+          </a:bodyPr>
+          <a:lstStyle/>
+          <a:p>
+            <a:r>
+              <a:rPr lang="ro-MD" sz="1200" dirty="0" smtClean="0"/>
+              <a:t>(511,479)</a:t>
+            </a:r>
+            <a:endParaRPr lang="en-US" sz="1200" dirty="0"/>
+          </a:p>
+        </p:txBody>
+      </p:sp>
+    </p:spTree>
+    <p:extLst>
+      <p:ext uri="{BB962C8B-B14F-4D97-AF65-F5344CB8AC3E}">
+        <p14:creationId xmlns:p14="http://schemas.microsoft.com/office/powerpoint/2010/main" val="1504684361"/>
+      </p:ext>
+    </p:extLst>
+  </p:cSld>
+  <p:clrMapOvr>
+    <a:masterClrMapping/>
+  </p:clrMapOvr>
+</p:sld>
+</file>
+
+<file path=ppt/slides/slide6.xml><?xml version="1.0" encoding="utf-8"?>
+<p:sld xmlns:a="http://schemas.openxmlformats.org/drawingml/2006/main" xmlns:r="http://schemas.openxmlformats.org/officeDocument/2006/relationships" xmlns:p="http://schemas.openxmlformats.org/presentationml/2006/main">
+  <p:cSld>
+    <p:spTree>
+      <p:nvGrpSpPr>
+        <p:cNvPr id="1" name=""/>
+        <p:cNvGrpSpPr/>
+        <p:nvPr/>
+      </p:nvGrpSpPr>
+      <p:grpSpPr>
+        <a:xfrm>
+          <a:off x="0" y="0"/>
+          <a:ext cx="0" cy="0"/>
+          <a:chOff x="0" y="0"/>
+          <a:chExt cx="0" cy="0"/>
+        </a:xfrm>
+      </p:grpSpPr>
+      <p:sp>
+        <p:nvSpPr>
+          <p:cNvPr id="2" name="Rectangle 1"/>
+          <p:cNvSpPr/>
+          <p:nvPr/>
+        </p:nvSpPr>
+        <p:spPr>
+          <a:xfrm>
+            <a:off x="1485237" y="1712422"/>
+            <a:ext cx="1512000" cy="1512000"/>
+          </a:xfrm>
+          <a:prstGeom prst="rect">
+            <a:avLst/>
+          </a:prstGeom>
+          <a:blipFill dpi="0" rotWithShape="1">
+            <a:blip r:embed="rId2">
+              <a:duotone>
+                <a:prstClr val="black"/>
+                <a:schemeClr val="accent1">
+                  <a:tint val="45000"/>
+                  <a:satMod val="400000"/>
+                </a:schemeClr>
+              </a:duotone>
+            </a:blip>
+            <a:srcRect/>
+            <a:stretch>
+              <a:fillRect/>
+            </a:stretch>
+          </a:blipFill>
+          <a:ln w="22225">
+            <a:solidFill>
+              <a:schemeClr val="tx1"/>
+            </a:solidFill>
+          </a:ln>
+        </p:spPr>
+        <p:style>
+          <a:lnRef idx="2">
+            <a:schemeClr val="accent1">
+              <a:shade val="50000"/>
+            </a:schemeClr>
+          </a:lnRef>
+          <a:fillRef idx="1">
+            <a:schemeClr val="accent1"/>
+          </a:fillRef>
+          <a:effectRef idx="0">
+            <a:schemeClr val="accent1"/>
+          </a:effectRef>
+          <a:fontRef idx="minor">
+            <a:schemeClr val="lt1"/>
+          </a:fontRef>
+        </p:style>
+        <p:txBody>
+          <a:bodyPr rtlCol="0" anchor="t" anchorCtr="0"/>
+          <a:lstStyle/>
+          <a:p>
+            <a:r>
+              <a:rPr lang="ro-MD" sz="1600" dirty="0" smtClean="0">
+                <a:solidFill>
+                  <a:schemeClr val="tx1"/>
+                </a:solidFill>
+                <a:latin typeface="Consolas" panose="020B0609020204030204" pitchFamily="49" charset="0"/>
+              </a:rPr>
+              <a:t>$2000</a:t>
+            </a:r>
+            <a:endParaRPr lang="en-US" sz="1600" dirty="0">
+              <a:solidFill>
+                <a:schemeClr val="tx1"/>
+              </a:solidFill>
+              <a:latin typeface="Consolas" panose="020B0609020204030204" pitchFamily="49" charset="0"/>
+            </a:endParaRPr>
+          </a:p>
+        </p:txBody>
+      </p:sp>
+      <p:sp>
+        <p:nvSpPr>
+          <p:cNvPr id="3" name="Rectangle 2"/>
+          <p:cNvSpPr/>
+          <p:nvPr/>
+        </p:nvSpPr>
+        <p:spPr>
+          <a:xfrm>
+            <a:off x="1485237" y="3228677"/>
+            <a:ext cx="1512000" cy="1512000"/>
+          </a:xfrm>
+          <a:prstGeom prst="rect">
+            <a:avLst/>
+          </a:prstGeom>
+          <a:blipFill dpi="0" rotWithShape="1">
+            <a:blip r:embed="rId2">
+              <a:duotone>
+                <a:prstClr val="black"/>
+                <a:schemeClr val="accent2">
+                  <a:tint val="45000"/>
+                  <a:satMod val="400000"/>
+                </a:schemeClr>
+              </a:duotone>
+            </a:blip>
+            <a:srcRect/>
+            <a:stretch>
+              <a:fillRect/>
+            </a:stretch>
+          </a:blipFill>
+          <a:ln w="22225">
+            <a:solidFill>
+              <a:schemeClr val="tx1"/>
+            </a:solidFill>
+          </a:ln>
+        </p:spPr>
+        <p:style>
+          <a:lnRef idx="2">
+            <a:schemeClr val="accent1">
+              <a:shade val="50000"/>
+            </a:schemeClr>
+          </a:lnRef>
+          <a:fillRef idx="1">
+            <a:schemeClr val="accent1"/>
+          </a:fillRef>
+          <a:effectRef idx="0">
+            <a:schemeClr val="accent1"/>
+          </a:effectRef>
+          <a:fontRef idx="minor">
+            <a:schemeClr val="lt1"/>
+          </a:fontRef>
+        </p:style>
+        <p:txBody>
+          <a:bodyPr rtlCol="0" anchor="t" anchorCtr="0"/>
+          <a:lstStyle/>
+          <a:p>
+            <a:r>
+              <a:rPr lang="ro-MD" sz="1600" dirty="0">
+                <a:solidFill>
+                  <a:schemeClr val="tx1"/>
+                </a:solidFill>
+                <a:latin typeface="Consolas" panose="020B0609020204030204" pitchFamily="49" charset="0"/>
+              </a:rPr>
+              <a:t>$</a:t>
+            </a:r>
+            <a:r>
+              <a:rPr lang="ro-MD" sz="1600" dirty="0" smtClean="0">
+                <a:solidFill>
+                  <a:schemeClr val="tx1"/>
+                </a:solidFill>
+                <a:latin typeface="Consolas" panose="020B0609020204030204" pitchFamily="49" charset="0"/>
+              </a:rPr>
+              <a:t>2800</a:t>
+            </a:r>
+            <a:endParaRPr lang="en-US" sz="1600" dirty="0"/>
+          </a:p>
+        </p:txBody>
+      </p:sp>
+      <p:sp>
+        <p:nvSpPr>
+          <p:cNvPr id="4" name="Rectangle 3"/>
+          <p:cNvSpPr/>
+          <p:nvPr/>
+        </p:nvSpPr>
+        <p:spPr>
+          <a:xfrm>
+            <a:off x="2997237" y="1712422"/>
+            <a:ext cx="1512000" cy="1512000"/>
+          </a:xfrm>
+          <a:prstGeom prst="rect">
+            <a:avLst/>
+          </a:prstGeom>
+          <a:blipFill dpi="0" rotWithShape="1">
+            <a:blip r:embed="rId2">
+              <a:alphaModFix amt="50000"/>
+              <a:duotone>
+                <a:prstClr val="black"/>
+                <a:schemeClr val="accent1">
+                  <a:tint val="45000"/>
+                  <a:satMod val="400000"/>
+                </a:schemeClr>
+              </a:duotone>
+            </a:blip>
+            <a:srcRect/>
+            <a:stretch>
+              <a:fillRect/>
+            </a:stretch>
+          </a:blipFill>
+          <a:ln w="22225">
+            <a:solidFill>
+              <a:schemeClr val="tx1"/>
+            </a:solidFill>
+          </a:ln>
+        </p:spPr>
+        <p:style>
+          <a:lnRef idx="2">
+            <a:schemeClr val="accent1">
+              <a:shade val="50000"/>
+            </a:schemeClr>
+          </a:lnRef>
+          <a:fillRef idx="1">
+            <a:schemeClr val="accent1"/>
+          </a:fillRef>
+          <a:effectRef idx="0">
+            <a:schemeClr val="accent1"/>
+          </a:effectRef>
+          <a:fontRef idx="minor">
+            <a:schemeClr val="lt1"/>
+          </a:fontRef>
+        </p:style>
+        <p:txBody>
+          <a:bodyPr rtlCol="0" anchor="t" anchorCtr="0"/>
+          <a:lstStyle/>
+          <a:p>
+            <a:r>
+              <a:rPr lang="ro-MD" sz="1600" dirty="0">
+                <a:solidFill>
+                  <a:schemeClr val="tx1"/>
+                </a:solidFill>
+                <a:latin typeface="Consolas" panose="020B0609020204030204" pitchFamily="49" charset="0"/>
+              </a:rPr>
+              <a:t>$</a:t>
+            </a:r>
+            <a:r>
+              <a:rPr lang="ro-MD" sz="1600" dirty="0" smtClean="0">
+                <a:solidFill>
+                  <a:schemeClr val="tx1"/>
+                </a:solidFill>
+                <a:latin typeface="Consolas" panose="020B0609020204030204" pitchFamily="49" charset="0"/>
+              </a:rPr>
+              <a:t>2400</a:t>
+            </a:r>
+            <a:endParaRPr lang="en-US" sz="1600" dirty="0">
+              <a:solidFill>
+                <a:schemeClr val="tx1"/>
+              </a:solidFill>
+              <a:latin typeface="Consolas" panose="020B0609020204030204" pitchFamily="49" charset="0"/>
+            </a:endParaRPr>
+          </a:p>
+        </p:txBody>
+      </p:sp>
+      <p:sp>
+        <p:nvSpPr>
+          <p:cNvPr id="5" name="Rectangle 4"/>
+          <p:cNvSpPr/>
+          <p:nvPr/>
+        </p:nvSpPr>
+        <p:spPr>
+          <a:xfrm>
+            <a:off x="2997237" y="3228677"/>
+            <a:ext cx="1512000" cy="1512000"/>
+          </a:xfrm>
+          <a:prstGeom prst="rect">
+            <a:avLst/>
+          </a:prstGeom>
+          <a:blipFill dpi="0" rotWithShape="1">
+            <a:blip r:embed="rId2">
+              <a:alphaModFix amt="50000"/>
+              <a:duotone>
+                <a:prstClr val="black"/>
+                <a:schemeClr val="accent2">
+                  <a:tint val="45000"/>
+                  <a:satMod val="400000"/>
+                </a:schemeClr>
+              </a:duotone>
+            </a:blip>
+            <a:srcRect/>
+            <a:stretch>
+              <a:fillRect/>
+            </a:stretch>
+          </a:blipFill>
+          <a:ln w="22225">
+            <a:solidFill>
+              <a:schemeClr val="tx1"/>
+            </a:solidFill>
+          </a:ln>
+        </p:spPr>
+        <p:style>
+          <a:lnRef idx="2">
+            <a:schemeClr val="accent1">
+              <a:shade val="50000"/>
+            </a:schemeClr>
+          </a:lnRef>
+          <a:fillRef idx="1">
+            <a:schemeClr val="accent1"/>
+          </a:fillRef>
+          <a:effectRef idx="0">
+            <a:schemeClr val="accent1"/>
+          </a:effectRef>
+          <a:fontRef idx="minor">
+            <a:schemeClr val="lt1"/>
+          </a:fontRef>
+        </p:style>
+        <p:txBody>
+          <a:bodyPr rtlCol="0" anchor="t" anchorCtr="0"/>
+          <a:lstStyle/>
+          <a:p>
+            <a:r>
+              <a:rPr lang="ro-MD" sz="1600" dirty="0">
+                <a:solidFill>
+                  <a:schemeClr val="tx1"/>
+                </a:solidFill>
+                <a:latin typeface="Consolas" panose="020B0609020204030204" pitchFamily="49" charset="0"/>
+              </a:rPr>
+              <a:t>$</a:t>
+            </a:r>
+            <a:r>
+              <a:rPr lang="ro-MD" sz="1600" dirty="0" smtClean="0">
+                <a:solidFill>
+                  <a:schemeClr val="tx1"/>
+                </a:solidFill>
+                <a:latin typeface="Consolas" panose="020B0609020204030204" pitchFamily="49" charset="0"/>
+              </a:rPr>
+              <a:t>2C00</a:t>
+            </a:r>
+            <a:endParaRPr lang="en-US" sz="1600" dirty="0"/>
+          </a:p>
+        </p:txBody>
+      </p:sp>
+      <p:sp>
+        <p:nvSpPr>
+          <p:cNvPr id="18" name="TextBox 17"/>
+          <p:cNvSpPr txBox="1"/>
+          <p:nvPr/>
+        </p:nvSpPr>
+        <p:spPr>
+          <a:xfrm>
+            <a:off x="1819486" y="1914424"/>
+            <a:ext cx="843501" cy="1107996"/>
+          </a:xfrm>
+          <a:prstGeom prst="rect">
+            <a:avLst/>
+          </a:prstGeom>
+          <a:noFill/>
+        </p:spPr>
+        <p:txBody>
+          <a:bodyPr wrap="none" rtlCol="0">
+            <a:spAutoFit/>
+          </a:bodyPr>
+          <a:lstStyle/>
+          <a:p>
+            <a:r>
+              <a:rPr lang="ro-MD" sz="6600" dirty="0" smtClean="0">
+                <a:solidFill>
+                  <a:schemeClr val="bg1"/>
+                </a:solidFill>
+                <a:latin typeface="Arial Black" panose="020B0A04020102020204" pitchFamily="34" charset="0"/>
+              </a:rPr>
+              <a:t>A</a:t>
+            </a:r>
+            <a:endParaRPr lang="en-US" dirty="0">
+              <a:solidFill>
+                <a:schemeClr val="bg1"/>
+              </a:solidFill>
+              <a:latin typeface="Arial Black" panose="020B0A04020102020204" pitchFamily="34" charset="0"/>
+            </a:endParaRPr>
+          </a:p>
+        </p:txBody>
+      </p:sp>
+      <p:sp>
+        <p:nvSpPr>
+          <p:cNvPr id="20" name="TextBox 19"/>
+          <p:cNvSpPr txBox="1"/>
+          <p:nvPr/>
+        </p:nvSpPr>
+        <p:spPr>
+          <a:xfrm>
+            <a:off x="3331486" y="1914424"/>
+            <a:ext cx="843501" cy="1107996"/>
+          </a:xfrm>
+          <a:prstGeom prst="rect">
+            <a:avLst/>
+          </a:prstGeom>
+          <a:noFill/>
+        </p:spPr>
+        <p:txBody>
+          <a:bodyPr wrap="none" rtlCol="0">
+            <a:spAutoFit/>
+          </a:bodyPr>
+          <a:lstStyle/>
+          <a:p>
+            <a:r>
+              <a:rPr lang="ro-MD" sz="6600" dirty="0" smtClean="0">
+                <a:solidFill>
+                  <a:schemeClr val="bg1"/>
+                </a:solidFill>
+                <a:latin typeface="Arial Black" panose="020B0A04020102020204" pitchFamily="34" charset="0"/>
+              </a:rPr>
+              <a:t>A</a:t>
+            </a:r>
+            <a:endParaRPr lang="en-US" dirty="0">
+              <a:solidFill>
+                <a:schemeClr val="bg1"/>
+              </a:solidFill>
+              <a:latin typeface="Arial Black" panose="020B0A04020102020204" pitchFamily="34" charset="0"/>
+            </a:endParaRPr>
+          </a:p>
+        </p:txBody>
+      </p:sp>
+      <p:sp>
+        <p:nvSpPr>
+          <p:cNvPr id="21" name="TextBox 20"/>
+          <p:cNvSpPr txBox="1"/>
+          <p:nvPr/>
+        </p:nvSpPr>
+        <p:spPr>
+          <a:xfrm>
+            <a:off x="1819485" y="3426424"/>
+            <a:ext cx="843501" cy="1107996"/>
+          </a:xfrm>
+          <a:prstGeom prst="rect">
+            <a:avLst/>
+          </a:prstGeom>
+          <a:noFill/>
+        </p:spPr>
+        <p:txBody>
+          <a:bodyPr wrap="none" rtlCol="0">
+            <a:spAutoFit/>
+          </a:bodyPr>
+          <a:lstStyle/>
+          <a:p>
+            <a:r>
+              <a:rPr lang="ro-MD" sz="6600" dirty="0" smtClean="0">
+                <a:solidFill>
+                  <a:schemeClr val="bg1"/>
+                </a:solidFill>
+                <a:latin typeface="Arial Black" panose="020B0A04020102020204" pitchFamily="34" charset="0"/>
+              </a:rPr>
+              <a:t>B</a:t>
+            </a:r>
+            <a:endParaRPr lang="en-US" dirty="0">
+              <a:solidFill>
+                <a:schemeClr val="bg1"/>
+              </a:solidFill>
+              <a:latin typeface="Arial Black" panose="020B0A04020102020204" pitchFamily="34" charset="0"/>
+            </a:endParaRPr>
+          </a:p>
+        </p:txBody>
+      </p:sp>
+      <p:sp>
+        <p:nvSpPr>
+          <p:cNvPr id="22" name="TextBox 21"/>
+          <p:cNvSpPr txBox="1"/>
+          <p:nvPr/>
+        </p:nvSpPr>
+        <p:spPr>
+          <a:xfrm>
+            <a:off x="3331485" y="3426424"/>
+            <a:ext cx="843501" cy="1107996"/>
+          </a:xfrm>
+          <a:prstGeom prst="rect">
+            <a:avLst/>
+          </a:prstGeom>
+          <a:noFill/>
+        </p:spPr>
+        <p:txBody>
+          <a:bodyPr wrap="none" rtlCol="0">
+            <a:spAutoFit/>
+          </a:bodyPr>
+          <a:lstStyle/>
+          <a:p>
+            <a:r>
+              <a:rPr lang="ro-MD" sz="6600" dirty="0" smtClean="0">
+                <a:solidFill>
+                  <a:schemeClr val="bg1"/>
+                </a:solidFill>
+                <a:latin typeface="Arial Black" panose="020B0A04020102020204" pitchFamily="34" charset="0"/>
+              </a:rPr>
+              <a:t>B</a:t>
+            </a:r>
+            <a:endParaRPr lang="en-US" dirty="0">
+              <a:solidFill>
+                <a:schemeClr val="bg1"/>
+              </a:solidFill>
+              <a:latin typeface="Arial Black" panose="020B0A04020102020204" pitchFamily="34" charset="0"/>
+            </a:endParaRPr>
+          </a:p>
+        </p:txBody>
+      </p:sp>
+      <p:sp>
+        <p:nvSpPr>
+          <p:cNvPr id="23" name="Rectangle 22"/>
+          <p:cNvSpPr/>
+          <p:nvPr/>
+        </p:nvSpPr>
+        <p:spPr>
+          <a:xfrm>
+            <a:off x="4792152" y="1712422"/>
+            <a:ext cx="1512000" cy="1512000"/>
+          </a:xfrm>
+          <a:prstGeom prst="rect">
+            <a:avLst/>
+          </a:prstGeom>
+          <a:blipFill dpi="0" rotWithShape="1">
+            <a:blip r:embed="rId2">
+              <a:duotone>
+                <a:prstClr val="black"/>
+                <a:schemeClr val="accent1">
+                  <a:tint val="45000"/>
+                  <a:satMod val="400000"/>
+                </a:schemeClr>
+              </a:duotone>
+            </a:blip>
+            <a:srcRect/>
+            <a:stretch>
+              <a:fillRect/>
+            </a:stretch>
+          </a:blipFill>
+          <a:ln w="22225">
+            <a:solidFill>
+              <a:schemeClr val="tx1"/>
+            </a:solidFill>
+          </a:ln>
+        </p:spPr>
+        <p:style>
+          <a:lnRef idx="2">
+            <a:schemeClr val="accent1">
+              <a:shade val="50000"/>
+            </a:schemeClr>
+          </a:lnRef>
+          <a:fillRef idx="1">
+            <a:schemeClr val="accent1"/>
+          </a:fillRef>
+          <a:effectRef idx="0">
+            <a:schemeClr val="accent1"/>
+          </a:effectRef>
+          <a:fontRef idx="minor">
+            <a:schemeClr val="lt1"/>
+          </a:fontRef>
+        </p:style>
+        <p:txBody>
+          <a:bodyPr rtlCol="0" anchor="t" anchorCtr="0"/>
+          <a:lstStyle/>
+          <a:p>
+            <a:r>
+              <a:rPr lang="ro-MD" sz="1600" dirty="0" smtClean="0">
+                <a:solidFill>
+                  <a:schemeClr val="tx1"/>
+                </a:solidFill>
+                <a:latin typeface="Consolas" panose="020B0609020204030204" pitchFamily="49" charset="0"/>
+              </a:rPr>
+              <a:t>$2000</a:t>
+            </a:r>
+            <a:endParaRPr lang="en-US" sz="1600" dirty="0">
+              <a:solidFill>
+                <a:schemeClr val="tx1"/>
+              </a:solidFill>
+              <a:latin typeface="Consolas" panose="020B0609020204030204" pitchFamily="49" charset="0"/>
+            </a:endParaRPr>
+          </a:p>
+        </p:txBody>
+      </p:sp>
+      <p:sp>
+        <p:nvSpPr>
+          <p:cNvPr id="24" name="Rectangle 23"/>
+          <p:cNvSpPr/>
+          <p:nvPr/>
+        </p:nvSpPr>
+        <p:spPr>
+          <a:xfrm>
+            <a:off x="4792152" y="3228677"/>
+            <a:ext cx="1512000" cy="1512000"/>
+          </a:xfrm>
+          <a:prstGeom prst="rect">
+            <a:avLst/>
+          </a:prstGeom>
+          <a:blipFill dpi="0" rotWithShape="1">
+            <a:blip r:embed="rId2">
+              <a:alphaModFix amt="50000"/>
+              <a:duotone>
+                <a:prstClr val="black"/>
+                <a:schemeClr val="accent1">
+                  <a:tint val="45000"/>
+                  <a:satMod val="400000"/>
+                </a:schemeClr>
+              </a:duotone>
+            </a:blip>
+            <a:srcRect/>
+            <a:stretch>
+              <a:fillRect/>
+            </a:stretch>
+          </a:blipFill>
+          <a:ln w="22225">
+            <a:solidFill>
+              <a:schemeClr val="tx1"/>
+            </a:solidFill>
+          </a:ln>
+        </p:spPr>
+        <p:style>
+          <a:lnRef idx="2">
+            <a:schemeClr val="accent1">
+              <a:shade val="50000"/>
+            </a:schemeClr>
+          </a:lnRef>
+          <a:fillRef idx="1">
+            <a:schemeClr val="accent1"/>
+          </a:fillRef>
+          <a:effectRef idx="0">
+            <a:schemeClr val="accent1"/>
+          </a:effectRef>
+          <a:fontRef idx="minor">
+            <a:schemeClr val="lt1"/>
+          </a:fontRef>
+        </p:style>
+        <p:txBody>
+          <a:bodyPr rtlCol="0" anchor="t" anchorCtr="0"/>
+          <a:lstStyle/>
+          <a:p>
+            <a:r>
+              <a:rPr lang="ro-MD" sz="1600" dirty="0">
+                <a:solidFill>
+                  <a:schemeClr val="tx1"/>
+                </a:solidFill>
+                <a:latin typeface="Consolas" panose="020B0609020204030204" pitchFamily="49" charset="0"/>
+              </a:rPr>
+              <a:t>$</a:t>
+            </a:r>
+            <a:r>
+              <a:rPr lang="ro-MD" sz="1600" dirty="0" smtClean="0">
+                <a:solidFill>
+                  <a:schemeClr val="tx1"/>
+                </a:solidFill>
+                <a:latin typeface="Consolas" panose="020B0609020204030204" pitchFamily="49" charset="0"/>
+              </a:rPr>
+              <a:t>2800</a:t>
+            </a:r>
+            <a:endParaRPr lang="en-US" sz="1600" dirty="0"/>
+          </a:p>
+        </p:txBody>
+      </p:sp>
+      <p:sp>
+        <p:nvSpPr>
+          <p:cNvPr id="25" name="Rectangle 24"/>
+          <p:cNvSpPr/>
+          <p:nvPr/>
+        </p:nvSpPr>
+        <p:spPr>
+          <a:xfrm>
+            <a:off x="6304152" y="1712422"/>
+            <a:ext cx="1512000" cy="1512000"/>
+          </a:xfrm>
+          <a:prstGeom prst="rect">
+            <a:avLst/>
+          </a:prstGeom>
+          <a:blipFill dpi="0" rotWithShape="1">
+            <a:blip r:embed="rId2">
+              <a:duotone>
+                <a:prstClr val="black"/>
+                <a:schemeClr val="accent2">
+                  <a:tint val="45000"/>
+                  <a:satMod val="400000"/>
+                </a:schemeClr>
+              </a:duotone>
+            </a:blip>
+            <a:srcRect/>
+            <a:stretch>
+              <a:fillRect/>
+            </a:stretch>
+          </a:blipFill>
+          <a:ln w="22225">
+            <a:solidFill>
+              <a:schemeClr val="tx1"/>
+            </a:solidFill>
+          </a:ln>
+        </p:spPr>
+        <p:style>
+          <a:lnRef idx="2">
+            <a:schemeClr val="accent1">
+              <a:shade val="50000"/>
+            </a:schemeClr>
+          </a:lnRef>
+          <a:fillRef idx="1">
+            <a:schemeClr val="accent1"/>
+          </a:fillRef>
+          <a:effectRef idx="0">
+            <a:schemeClr val="accent1"/>
+          </a:effectRef>
+          <a:fontRef idx="minor">
+            <a:schemeClr val="lt1"/>
+          </a:fontRef>
+        </p:style>
+        <p:txBody>
+          <a:bodyPr rtlCol="0" anchor="t" anchorCtr="0"/>
+          <a:lstStyle/>
+          <a:p>
+            <a:r>
+              <a:rPr lang="ro-MD" sz="1600" dirty="0">
+                <a:solidFill>
+                  <a:schemeClr val="tx1"/>
+                </a:solidFill>
+                <a:latin typeface="Consolas" panose="020B0609020204030204" pitchFamily="49" charset="0"/>
+              </a:rPr>
+              <a:t>$</a:t>
+            </a:r>
+            <a:r>
+              <a:rPr lang="ro-MD" sz="1600" dirty="0" smtClean="0">
+                <a:solidFill>
+                  <a:schemeClr val="tx1"/>
+                </a:solidFill>
+                <a:latin typeface="Consolas" panose="020B0609020204030204" pitchFamily="49" charset="0"/>
+              </a:rPr>
+              <a:t>2400</a:t>
+            </a:r>
+            <a:endParaRPr lang="en-US" sz="1600" dirty="0">
+              <a:solidFill>
+                <a:schemeClr val="tx1"/>
+              </a:solidFill>
+              <a:latin typeface="Consolas" panose="020B0609020204030204" pitchFamily="49" charset="0"/>
+            </a:endParaRPr>
+          </a:p>
+        </p:txBody>
+      </p:sp>
+      <p:sp>
+        <p:nvSpPr>
+          <p:cNvPr id="26" name="Rectangle 25"/>
+          <p:cNvSpPr/>
+          <p:nvPr/>
+        </p:nvSpPr>
+        <p:spPr>
+          <a:xfrm>
+            <a:off x="6304152" y="3228677"/>
+            <a:ext cx="1512000" cy="1512000"/>
+          </a:xfrm>
+          <a:prstGeom prst="rect">
+            <a:avLst/>
+          </a:prstGeom>
+          <a:blipFill dpi="0" rotWithShape="1">
+            <a:blip r:embed="rId2">
+              <a:alphaModFix amt="50000"/>
+              <a:duotone>
+                <a:prstClr val="black"/>
+                <a:schemeClr val="accent2">
+                  <a:tint val="45000"/>
+                  <a:satMod val="400000"/>
+                </a:schemeClr>
+              </a:duotone>
+            </a:blip>
+            <a:srcRect/>
+            <a:stretch>
+              <a:fillRect/>
+            </a:stretch>
+          </a:blipFill>
+          <a:ln w="22225">
+            <a:solidFill>
+              <a:schemeClr val="tx1"/>
+            </a:solidFill>
+          </a:ln>
+        </p:spPr>
+        <p:style>
+          <a:lnRef idx="2">
+            <a:schemeClr val="accent1">
+              <a:shade val="50000"/>
+            </a:schemeClr>
+          </a:lnRef>
+          <a:fillRef idx="1">
+            <a:schemeClr val="accent1"/>
+          </a:fillRef>
+          <a:effectRef idx="0">
+            <a:schemeClr val="accent1"/>
+          </a:effectRef>
+          <a:fontRef idx="minor">
+            <a:schemeClr val="lt1"/>
+          </a:fontRef>
+        </p:style>
+        <p:txBody>
+          <a:bodyPr rtlCol="0" anchor="t" anchorCtr="0"/>
+          <a:lstStyle/>
+          <a:p>
+            <a:r>
+              <a:rPr lang="ro-MD" sz="1600" dirty="0">
+                <a:solidFill>
+                  <a:schemeClr val="tx1"/>
+                </a:solidFill>
+                <a:latin typeface="Consolas" panose="020B0609020204030204" pitchFamily="49" charset="0"/>
+              </a:rPr>
+              <a:t>$</a:t>
+            </a:r>
+            <a:r>
+              <a:rPr lang="ro-MD" sz="1600" dirty="0" smtClean="0">
+                <a:solidFill>
+                  <a:schemeClr val="tx1"/>
+                </a:solidFill>
+                <a:latin typeface="Consolas" panose="020B0609020204030204" pitchFamily="49" charset="0"/>
+              </a:rPr>
+              <a:t>2C00</a:t>
+            </a:r>
+            <a:endParaRPr lang="en-US" sz="1600" dirty="0"/>
+          </a:p>
+        </p:txBody>
+      </p:sp>
+      <p:sp>
+        <p:nvSpPr>
+          <p:cNvPr id="27" name="TextBox 26"/>
+          <p:cNvSpPr txBox="1"/>
+          <p:nvPr/>
+        </p:nvSpPr>
+        <p:spPr>
+          <a:xfrm>
+            <a:off x="5126401" y="1914424"/>
+            <a:ext cx="843501" cy="1107996"/>
+          </a:xfrm>
+          <a:prstGeom prst="rect">
+            <a:avLst/>
+          </a:prstGeom>
+          <a:noFill/>
+        </p:spPr>
+        <p:txBody>
+          <a:bodyPr wrap="none" rtlCol="0">
+            <a:spAutoFit/>
+          </a:bodyPr>
+          <a:lstStyle/>
+          <a:p>
+            <a:r>
+              <a:rPr lang="ro-MD" sz="6600" dirty="0" smtClean="0">
+                <a:solidFill>
+                  <a:schemeClr val="bg1"/>
+                </a:solidFill>
+                <a:latin typeface="Arial Black" panose="020B0A04020102020204" pitchFamily="34" charset="0"/>
+              </a:rPr>
+              <a:t>A</a:t>
+            </a:r>
+            <a:endParaRPr lang="en-US" dirty="0">
+              <a:solidFill>
+                <a:schemeClr val="bg1"/>
+              </a:solidFill>
+              <a:latin typeface="Arial Black" panose="020B0A04020102020204" pitchFamily="34" charset="0"/>
+            </a:endParaRPr>
+          </a:p>
+        </p:txBody>
+      </p:sp>
+      <p:sp>
+        <p:nvSpPr>
+          <p:cNvPr id="28" name="TextBox 27"/>
+          <p:cNvSpPr txBox="1"/>
+          <p:nvPr/>
+        </p:nvSpPr>
+        <p:spPr>
+          <a:xfrm>
+            <a:off x="6638401" y="1914424"/>
+            <a:ext cx="843501" cy="1107996"/>
+          </a:xfrm>
+          <a:prstGeom prst="rect">
+            <a:avLst/>
+          </a:prstGeom>
+          <a:noFill/>
+        </p:spPr>
+        <p:txBody>
+          <a:bodyPr wrap="none" rtlCol="0">
+            <a:spAutoFit/>
+          </a:bodyPr>
+          <a:lstStyle/>
+          <a:p>
+            <a:r>
+              <a:rPr lang="ro-MD" sz="6600" dirty="0" smtClean="0">
+                <a:solidFill>
+                  <a:schemeClr val="bg1"/>
+                </a:solidFill>
+                <a:latin typeface="Arial Black" panose="020B0A04020102020204" pitchFamily="34" charset="0"/>
+              </a:rPr>
+              <a:t>B</a:t>
+            </a:r>
+            <a:endParaRPr lang="en-US" dirty="0">
+              <a:solidFill>
+                <a:schemeClr val="bg1"/>
+              </a:solidFill>
+              <a:latin typeface="Arial Black" panose="020B0A04020102020204" pitchFamily="34" charset="0"/>
+            </a:endParaRPr>
+          </a:p>
+        </p:txBody>
+      </p:sp>
+      <p:sp>
+        <p:nvSpPr>
+          <p:cNvPr id="29" name="TextBox 28"/>
+          <p:cNvSpPr txBox="1"/>
+          <p:nvPr/>
+        </p:nvSpPr>
+        <p:spPr>
+          <a:xfrm>
+            <a:off x="5126400" y="3426424"/>
+            <a:ext cx="843501" cy="1107996"/>
+          </a:xfrm>
+          <a:prstGeom prst="rect">
+            <a:avLst/>
+          </a:prstGeom>
+          <a:noFill/>
+        </p:spPr>
+        <p:txBody>
+          <a:bodyPr wrap="none" rtlCol="0">
+            <a:spAutoFit/>
+          </a:bodyPr>
+          <a:lstStyle/>
+          <a:p>
+            <a:r>
+              <a:rPr lang="ro-MD" sz="6600" dirty="0" smtClean="0">
+                <a:solidFill>
+                  <a:schemeClr val="bg1"/>
+                </a:solidFill>
+                <a:latin typeface="Arial Black" panose="020B0A04020102020204" pitchFamily="34" charset="0"/>
+              </a:rPr>
+              <a:t>A</a:t>
+            </a:r>
+            <a:endParaRPr lang="en-US" dirty="0">
+              <a:solidFill>
+                <a:schemeClr val="bg1"/>
+              </a:solidFill>
+              <a:latin typeface="Arial Black" panose="020B0A04020102020204" pitchFamily="34" charset="0"/>
+            </a:endParaRPr>
+          </a:p>
+        </p:txBody>
+      </p:sp>
+      <p:sp>
+        <p:nvSpPr>
+          <p:cNvPr id="30" name="TextBox 29"/>
+          <p:cNvSpPr txBox="1"/>
+          <p:nvPr/>
+        </p:nvSpPr>
+        <p:spPr>
+          <a:xfrm>
+            <a:off x="6638400" y="3426424"/>
+            <a:ext cx="843501" cy="1107996"/>
+          </a:xfrm>
+          <a:prstGeom prst="rect">
+            <a:avLst/>
+          </a:prstGeom>
+          <a:noFill/>
+        </p:spPr>
+        <p:txBody>
+          <a:bodyPr wrap="none" rtlCol="0">
+            <a:spAutoFit/>
+          </a:bodyPr>
+          <a:lstStyle/>
+          <a:p>
+            <a:r>
+              <a:rPr lang="ro-MD" sz="6600" dirty="0" smtClean="0">
+                <a:solidFill>
+                  <a:schemeClr val="bg1"/>
+                </a:solidFill>
+                <a:latin typeface="Arial Black" panose="020B0A04020102020204" pitchFamily="34" charset="0"/>
+              </a:rPr>
+              <a:t>B</a:t>
+            </a:r>
+            <a:endParaRPr lang="en-US" dirty="0">
+              <a:solidFill>
+                <a:schemeClr val="bg1"/>
+              </a:solidFill>
+              <a:latin typeface="Arial Black" panose="020B0A04020102020204" pitchFamily="34" charset="0"/>
+            </a:endParaRPr>
+          </a:p>
+        </p:txBody>
+      </p:sp>
+    </p:spTree>
+    <p:extLst>
+      <p:ext uri="{BB962C8B-B14F-4D97-AF65-F5344CB8AC3E}">
+        <p14:creationId xmlns:p14="http://schemas.microsoft.com/office/powerpoint/2010/main" val="3728404270"/>
+      </p:ext>
+    </p:extLst>
+  </p:cSld>
+  <p:clrMapOvr>
+    <a:masterClrMapping/>
+  </p:clrMapOvr>
+</p:sld>
+</file>
+
+<file path=ppt/slides/slide7.xml><?xml version="1.0" encoding="utf-8"?>
+<p:sld xmlns:a="http://schemas.openxmlformats.org/drawingml/2006/main" xmlns:r="http://schemas.openxmlformats.org/officeDocument/2006/relationships" xmlns:p="http://schemas.openxmlformats.org/presentationml/2006/main">
+  <p:cSld>
+    <p:spTree>
+      <p:nvGrpSpPr>
+        <p:cNvPr id="1" name=""/>
+        <p:cNvGrpSpPr/>
+        <p:nvPr/>
+      </p:nvGrpSpPr>
+      <p:grpSpPr>
+        <a:xfrm>
+          <a:off x="0" y="0"/>
+          <a:ext cx="0" cy="0"/>
+          <a:chOff x="0" y="0"/>
+          <a:chExt cx="0" cy="0"/>
+        </a:xfrm>
+      </p:grpSpPr>
+      <p:sp>
+        <p:nvSpPr>
+          <p:cNvPr id="2" name="Rectangle 1"/>
+          <p:cNvSpPr/>
+          <p:nvPr/>
+        </p:nvSpPr>
+        <p:spPr>
+          <a:xfrm>
+            <a:off x="1481136" y="1712422"/>
+            <a:ext cx="1512000" cy="1512000"/>
+          </a:xfrm>
+          <a:prstGeom prst="rect">
+            <a:avLst/>
+          </a:prstGeom>
+          <a:blipFill dpi="0" rotWithShape="1">
+            <a:blip r:embed="rId2">
+              <a:duotone>
+                <a:prstClr val="black"/>
+                <a:schemeClr val="accent2">
+                  <a:tint val="45000"/>
+                  <a:satMod val="400000"/>
+                </a:schemeClr>
+              </a:duotone>
+            </a:blip>
+            <a:srcRect/>
+            <a:stretch>
+              <a:fillRect/>
+            </a:stretch>
+          </a:blipFill>
+          <a:ln w="22225">
+            <a:solidFill>
+              <a:schemeClr val="tx1"/>
+            </a:solidFill>
+          </a:ln>
+        </p:spPr>
+        <p:style>
+          <a:lnRef idx="2">
+            <a:schemeClr val="accent1">
+              <a:shade val="50000"/>
+            </a:schemeClr>
+          </a:lnRef>
+          <a:fillRef idx="1">
+            <a:schemeClr val="accent1"/>
+          </a:fillRef>
+          <a:effectRef idx="0">
+            <a:schemeClr val="accent1"/>
+          </a:effectRef>
+          <a:fontRef idx="minor">
+            <a:schemeClr val="lt1"/>
+          </a:fontRef>
+        </p:style>
+        <p:txBody>
+          <a:bodyPr rtlCol="0" anchor="t" anchorCtr="0"/>
+          <a:lstStyle/>
+          <a:p>
+            <a:r>
+              <a:rPr lang="ro-MD" sz="1600" dirty="0" smtClean="0">
+                <a:solidFill>
+                  <a:schemeClr val="tx1"/>
+                </a:solidFill>
+                <a:latin typeface="Consolas" panose="020B0609020204030204" pitchFamily="49" charset="0"/>
+              </a:rPr>
+              <a:t>$2000</a:t>
+            </a:r>
+            <a:endParaRPr lang="en-US" sz="1600" dirty="0">
+              <a:solidFill>
+                <a:schemeClr val="tx1"/>
+              </a:solidFill>
+              <a:latin typeface="Consolas" panose="020B0609020204030204" pitchFamily="49" charset="0"/>
+            </a:endParaRPr>
+          </a:p>
+        </p:txBody>
+      </p:sp>
+      <p:sp>
+        <p:nvSpPr>
+          <p:cNvPr id="3" name="Rectangle 2"/>
+          <p:cNvSpPr/>
+          <p:nvPr/>
+        </p:nvSpPr>
+        <p:spPr>
+          <a:xfrm>
+            <a:off x="1481136" y="3228677"/>
+            <a:ext cx="1512000" cy="1512000"/>
+          </a:xfrm>
+          <a:prstGeom prst="rect">
+            <a:avLst/>
+          </a:prstGeom>
+          <a:blipFill dpi="0" rotWithShape="1">
+            <a:blip r:embed="rId2">
+              <a:alphaModFix amt="50000"/>
+              <a:duotone>
+                <a:prstClr val="black"/>
+                <a:schemeClr val="accent2">
+                  <a:tint val="45000"/>
+                  <a:satMod val="400000"/>
+                </a:schemeClr>
+              </a:duotone>
+            </a:blip>
+            <a:srcRect/>
+            <a:stretch>
+              <a:fillRect/>
+            </a:stretch>
+          </a:blipFill>
+          <a:ln w="22225">
+            <a:solidFill>
+              <a:schemeClr val="tx1"/>
+            </a:solidFill>
+          </a:ln>
+        </p:spPr>
+        <p:style>
+          <a:lnRef idx="2">
+            <a:schemeClr val="accent1">
+              <a:shade val="50000"/>
+            </a:schemeClr>
+          </a:lnRef>
+          <a:fillRef idx="1">
+            <a:schemeClr val="accent1"/>
+          </a:fillRef>
+          <a:effectRef idx="0">
+            <a:schemeClr val="accent1"/>
+          </a:effectRef>
+          <a:fontRef idx="minor">
+            <a:schemeClr val="lt1"/>
+          </a:fontRef>
+        </p:style>
+        <p:txBody>
+          <a:bodyPr rtlCol="0" anchor="t" anchorCtr="0"/>
+          <a:lstStyle/>
+          <a:p>
+            <a:r>
+              <a:rPr lang="ro-MD" sz="1600" dirty="0">
+                <a:solidFill>
+                  <a:schemeClr val="tx1"/>
+                </a:solidFill>
+                <a:latin typeface="Consolas" panose="020B0609020204030204" pitchFamily="49" charset="0"/>
+              </a:rPr>
+              <a:t>$</a:t>
+            </a:r>
+            <a:r>
+              <a:rPr lang="ro-MD" sz="1600" dirty="0" smtClean="0">
+                <a:solidFill>
+                  <a:schemeClr val="tx1"/>
+                </a:solidFill>
+                <a:latin typeface="Consolas" panose="020B0609020204030204" pitchFamily="49" charset="0"/>
+              </a:rPr>
+              <a:t>2800</a:t>
+            </a:r>
+            <a:endParaRPr lang="en-US" sz="1600" dirty="0"/>
+          </a:p>
+        </p:txBody>
+      </p:sp>
+      <p:sp>
+        <p:nvSpPr>
+          <p:cNvPr id="4" name="Rectangle 3"/>
+          <p:cNvSpPr/>
+          <p:nvPr/>
+        </p:nvSpPr>
+        <p:spPr>
+          <a:xfrm>
+            <a:off x="2993136" y="1712422"/>
+            <a:ext cx="1512000" cy="1512000"/>
+          </a:xfrm>
+          <a:prstGeom prst="rect">
+            <a:avLst/>
+          </a:prstGeom>
+          <a:blipFill dpi="0" rotWithShape="1">
+            <a:blip r:embed="rId2">
+              <a:alphaModFix amt="50000"/>
+              <a:duotone>
+                <a:prstClr val="black"/>
+                <a:schemeClr val="accent2">
+                  <a:tint val="45000"/>
+                  <a:satMod val="400000"/>
+                </a:schemeClr>
+              </a:duotone>
+            </a:blip>
+            <a:srcRect/>
+            <a:stretch>
+              <a:fillRect/>
+            </a:stretch>
+          </a:blipFill>
+          <a:ln w="22225">
+            <a:solidFill>
+              <a:schemeClr val="tx1"/>
+            </a:solidFill>
+          </a:ln>
+        </p:spPr>
+        <p:style>
+          <a:lnRef idx="2">
+            <a:schemeClr val="accent1">
+              <a:shade val="50000"/>
+            </a:schemeClr>
+          </a:lnRef>
+          <a:fillRef idx="1">
+            <a:schemeClr val="accent1"/>
+          </a:fillRef>
+          <a:effectRef idx="0">
+            <a:schemeClr val="accent1"/>
+          </a:effectRef>
+          <a:fontRef idx="minor">
+            <a:schemeClr val="lt1"/>
+          </a:fontRef>
+        </p:style>
+        <p:txBody>
+          <a:bodyPr rtlCol="0" anchor="t" anchorCtr="0"/>
+          <a:lstStyle/>
+          <a:p>
+            <a:r>
+              <a:rPr lang="ro-MD" sz="1600" dirty="0">
+                <a:solidFill>
+                  <a:schemeClr val="tx1"/>
+                </a:solidFill>
+                <a:latin typeface="Consolas" panose="020B0609020204030204" pitchFamily="49" charset="0"/>
+              </a:rPr>
+              <a:t>$</a:t>
+            </a:r>
+            <a:r>
+              <a:rPr lang="ro-MD" sz="1600" dirty="0" smtClean="0">
+                <a:solidFill>
+                  <a:schemeClr val="tx1"/>
+                </a:solidFill>
+                <a:latin typeface="Consolas" panose="020B0609020204030204" pitchFamily="49" charset="0"/>
+              </a:rPr>
+              <a:t>2400</a:t>
+            </a:r>
+            <a:endParaRPr lang="en-US" sz="1600" dirty="0">
+              <a:solidFill>
+                <a:schemeClr val="tx1"/>
+              </a:solidFill>
+              <a:latin typeface="Consolas" panose="020B0609020204030204" pitchFamily="49" charset="0"/>
+            </a:endParaRPr>
+          </a:p>
+        </p:txBody>
+      </p:sp>
+      <p:sp>
+        <p:nvSpPr>
+          <p:cNvPr id="5" name="Rectangle 4"/>
+          <p:cNvSpPr/>
+          <p:nvPr/>
+        </p:nvSpPr>
+        <p:spPr>
+          <a:xfrm>
+            <a:off x="2993136" y="3228677"/>
+            <a:ext cx="1512000" cy="1512000"/>
+          </a:xfrm>
+          <a:prstGeom prst="rect">
+            <a:avLst/>
+          </a:prstGeom>
+          <a:blipFill dpi="0" rotWithShape="1">
+            <a:blip r:embed="rId2">
+              <a:alphaModFix amt="50000"/>
+              <a:duotone>
+                <a:prstClr val="black"/>
+                <a:schemeClr val="accent2">
+                  <a:tint val="45000"/>
+                  <a:satMod val="400000"/>
+                </a:schemeClr>
+              </a:duotone>
+            </a:blip>
+            <a:srcRect/>
+            <a:stretch>
+              <a:fillRect/>
+            </a:stretch>
+          </a:blipFill>
+          <a:ln w="22225">
+            <a:solidFill>
+              <a:schemeClr val="tx1"/>
+            </a:solidFill>
+          </a:ln>
+        </p:spPr>
+        <p:style>
+          <a:lnRef idx="2">
+            <a:schemeClr val="accent1">
+              <a:shade val="50000"/>
+            </a:schemeClr>
+          </a:lnRef>
+          <a:fillRef idx="1">
+            <a:schemeClr val="accent1"/>
+          </a:fillRef>
+          <a:effectRef idx="0">
+            <a:schemeClr val="accent1"/>
+          </a:effectRef>
+          <a:fontRef idx="minor">
+            <a:schemeClr val="lt1"/>
+          </a:fontRef>
+        </p:style>
+        <p:txBody>
+          <a:bodyPr rtlCol="0" anchor="t" anchorCtr="0"/>
+          <a:lstStyle/>
+          <a:p>
+            <a:r>
+              <a:rPr lang="ro-MD" sz="1600" dirty="0">
+                <a:solidFill>
+                  <a:schemeClr val="tx1"/>
+                </a:solidFill>
+                <a:latin typeface="Consolas" panose="020B0609020204030204" pitchFamily="49" charset="0"/>
+              </a:rPr>
+              <a:t>$</a:t>
+            </a:r>
+            <a:r>
+              <a:rPr lang="ro-MD" sz="1600" dirty="0" smtClean="0">
+                <a:solidFill>
+                  <a:schemeClr val="tx1"/>
+                </a:solidFill>
+                <a:latin typeface="Consolas" panose="020B0609020204030204" pitchFamily="49" charset="0"/>
+              </a:rPr>
+              <a:t>2C00</a:t>
+            </a:r>
+            <a:endParaRPr lang="en-US" sz="1600" dirty="0"/>
+          </a:p>
+        </p:txBody>
+      </p:sp>
+      <p:sp>
+        <p:nvSpPr>
+          <p:cNvPr id="18" name="TextBox 17"/>
+          <p:cNvSpPr txBox="1"/>
+          <p:nvPr/>
+        </p:nvSpPr>
+        <p:spPr>
+          <a:xfrm>
+            <a:off x="1815385" y="1914424"/>
+            <a:ext cx="843501" cy="1107996"/>
+          </a:xfrm>
+          <a:prstGeom prst="rect">
+            <a:avLst/>
+          </a:prstGeom>
+          <a:noFill/>
+        </p:spPr>
+        <p:txBody>
+          <a:bodyPr wrap="none" rtlCol="0">
+            <a:spAutoFit/>
+          </a:bodyPr>
+          <a:lstStyle/>
+          <a:p>
+            <a:r>
+              <a:rPr lang="ro-MD" sz="6600" dirty="0" smtClean="0">
+                <a:solidFill>
+                  <a:schemeClr val="bg1"/>
+                </a:solidFill>
+                <a:latin typeface="Arial Black" panose="020B0A04020102020204" pitchFamily="34" charset="0"/>
+              </a:rPr>
+              <a:t>B</a:t>
+            </a:r>
+            <a:endParaRPr lang="en-US" dirty="0">
+              <a:solidFill>
+                <a:schemeClr val="bg1"/>
+              </a:solidFill>
+              <a:latin typeface="Arial Black" panose="020B0A04020102020204" pitchFamily="34" charset="0"/>
+            </a:endParaRPr>
+          </a:p>
+        </p:txBody>
+      </p:sp>
+      <p:sp>
+        <p:nvSpPr>
+          <p:cNvPr id="20" name="TextBox 19"/>
+          <p:cNvSpPr txBox="1"/>
+          <p:nvPr/>
+        </p:nvSpPr>
+        <p:spPr>
+          <a:xfrm>
+            <a:off x="3327385" y="1914424"/>
+            <a:ext cx="843501" cy="1107996"/>
+          </a:xfrm>
+          <a:prstGeom prst="rect">
+            <a:avLst/>
+          </a:prstGeom>
+          <a:noFill/>
+        </p:spPr>
+        <p:txBody>
+          <a:bodyPr wrap="none" rtlCol="0">
+            <a:spAutoFit/>
+          </a:bodyPr>
+          <a:lstStyle/>
+          <a:p>
+            <a:r>
+              <a:rPr lang="ro-MD" sz="6600" dirty="0" smtClean="0">
+                <a:solidFill>
+                  <a:schemeClr val="bg1"/>
+                </a:solidFill>
+                <a:latin typeface="Arial Black" panose="020B0A04020102020204" pitchFamily="34" charset="0"/>
+              </a:rPr>
+              <a:t>B</a:t>
+            </a:r>
+            <a:endParaRPr lang="en-US" dirty="0">
+              <a:solidFill>
+                <a:schemeClr val="bg1"/>
+              </a:solidFill>
+              <a:latin typeface="Arial Black" panose="020B0A04020102020204" pitchFamily="34" charset="0"/>
+            </a:endParaRPr>
+          </a:p>
+        </p:txBody>
+      </p:sp>
+      <p:sp>
+        <p:nvSpPr>
+          <p:cNvPr id="21" name="TextBox 20"/>
+          <p:cNvSpPr txBox="1"/>
+          <p:nvPr/>
+        </p:nvSpPr>
+        <p:spPr>
+          <a:xfrm>
+            <a:off x="1815384" y="3426424"/>
+            <a:ext cx="843501" cy="1107996"/>
+          </a:xfrm>
+          <a:prstGeom prst="rect">
+            <a:avLst/>
+          </a:prstGeom>
+          <a:noFill/>
+        </p:spPr>
+        <p:txBody>
+          <a:bodyPr wrap="none" rtlCol="0">
+            <a:spAutoFit/>
+          </a:bodyPr>
+          <a:lstStyle/>
+          <a:p>
+            <a:r>
+              <a:rPr lang="ro-MD" sz="6600" dirty="0" smtClean="0">
+                <a:solidFill>
+                  <a:schemeClr val="bg1"/>
+                </a:solidFill>
+                <a:latin typeface="Arial Black" panose="020B0A04020102020204" pitchFamily="34" charset="0"/>
+              </a:rPr>
+              <a:t>B</a:t>
+            </a:r>
+            <a:endParaRPr lang="en-US" dirty="0">
+              <a:solidFill>
+                <a:schemeClr val="bg1"/>
+              </a:solidFill>
+              <a:latin typeface="Arial Black" panose="020B0A04020102020204" pitchFamily="34" charset="0"/>
+            </a:endParaRPr>
+          </a:p>
+        </p:txBody>
+      </p:sp>
+      <p:sp>
+        <p:nvSpPr>
+          <p:cNvPr id="22" name="TextBox 21"/>
+          <p:cNvSpPr txBox="1"/>
+          <p:nvPr/>
+        </p:nvSpPr>
+        <p:spPr>
+          <a:xfrm>
+            <a:off x="3327384" y="3426424"/>
+            <a:ext cx="843501" cy="1107996"/>
+          </a:xfrm>
+          <a:prstGeom prst="rect">
+            <a:avLst/>
+          </a:prstGeom>
+          <a:noFill/>
+        </p:spPr>
+        <p:txBody>
+          <a:bodyPr wrap="none" rtlCol="0">
+            <a:spAutoFit/>
+          </a:bodyPr>
+          <a:lstStyle/>
+          <a:p>
+            <a:r>
+              <a:rPr lang="ro-MD" sz="6600" dirty="0" smtClean="0">
+                <a:solidFill>
+                  <a:schemeClr val="bg1"/>
+                </a:solidFill>
+                <a:latin typeface="Arial Black" panose="020B0A04020102020204" pitchFamily="34" charset="0"/>
+              </a:rPr>
+              <a:t>B</a:t>
+            </a:r>
+            <a:endParaRPr lang="en-US" dirty="0">
+              <a:solidFill>
+                <a:schemeClr val="bg1"/>
+              </a:solidFill>
+              <a:latin typeface="Arial Black" panose="020B0A04020102020204" pitchFamily="34" charset="0"/>
+            </a:endParaRPr>
+          </a:p>
+        </p:txBody>
+      </p:sp>
+      <p:sp>
+        <p:nvSpPr>
+          <p:cNvPr id="10" name="Rectangle 9"/>
+          <p:cNvSpPr/>
+          <p:nvPr/>
+        </p:nvSpPr>
+        <p:spPr>
+          <a:xfrm>
+            <a:off x="4792148" y="1712422"/>
+            <a:ext cx="1512000" cy="1512000"/>
+          </a:xfrm>
+          <a:prstGeom prst="rect">
+            <a:avLst/>
+          </a:prstGeom>
+          <a:blipFill dpi="0" rotWithShape="1">
+            <a:blip r:embed="rId2">
+              <a:duotone>
+                <a:prstClr val="black"/>
+                <a:schemeClr val="accent1">
+                  <a:tint val="45000"/>
+                  <a:satMod val="400000"/>
+                </a:schemeClr>
+              </a:duotone>
+            </a:blip>
+            <a:srcRect/>
+            <a:stretch>
+              <a:fillRect/>
+            </a:stretch>
+          </a:blipFill>
+          <a:ln w="22225">
+            <a:solidFill>
+              <a:schemeClr val="tx1"/>
+            </a:solidFill>
+          </a:ln>
+        </p:spPr>
+        <p:style>
+          <a:lnRef idx="2">
+            <a:schemeClr val="accent1">
+              <a:shade val="50000"/>
+            </a:schemeClr>
+          </a:lnRef>
+          <a:fillRef idx="1">
+            <a:schemeClr val="accent1"/>
+          </a:fillRef>
+          <a:effectRef idx="0">
+            <a:schemeClr val="accent1"/>
+          </a:effectRef>
+          <a:fontRef idx="minor">
+            <a:schemeClr val="lt1"/>
+          </a:fontRef>
+        </p:style>
+        <p:txBody>
+          <a:bodyPr rtlCol="0" anchor="t" anchorCtr="0"/>
+          <a:lstStyle/>
+          <a:p>
+            <a:r>
+              <a:rPr lang="ro-MD" sz="1600" dirty="0" smtClean="0">
+                <a:solidFill>
+                  <a:schemeClr val="tx1"/>
+                </a:solidFill>
+                <a:latin typeface="Consolas" panose="020B0609020204030204" pitchFamily="49" charset="0"/>
+              </a:rPr>
+              <a:t>$2000</a:t>
+            </a:r>
+            <a:endParaRPr lang="en-US" sz="1600" dirty="0">
+              <a:solidFill>
+                <a:schemeClr val="tx1"/>
+              </a:solidFill>
+              <a:latin typeface="Consolas" panose="020B0609020204030204" pitchFamily="49" charset="0"/>
+            </a:endParaRPr>
+          </a:p>
+        </p:txBody>
+      </p:sp>
+      <p:sp>
+        <p:nvSpPr>
+          <p:cNvPr id="11" name="Rectangle 10"/>
+          <p:cNvSpPr/>
+          <p:nvPr/>
+        </p:nvSpPr>
+        <p:spPr>
+          <a:xfrm>
+            <a:off x="4792148" y="3228677"/>
+            <a:ext cx="1512000" cy="1512000"/>
+          </a:xfrm>
+          <a:prstGeom prst="rect">
+            <a:avLst/>
+          </a:prstGeom>
+          <a:blipFill dpi="0" rotWithShape="1">
+            <a:blip r:embed="rId2">
+              <a:alphaModFix amt="50000"/>
+              <a:duotone>
+                <a:prstClr val="black"/>
+                <a:schemeClr val="accent1">
+                  <a:tint val="45000"/>
+                  <a:satMod val="400000"/>
+                </a:schemeClr>
+              </a:duotone>
+            </a:blip>
+            <a:srcRect/>
+            <a:stretch>
+              <a:fillRect/>
+            </a:stretch>
+          </a:blipFill>
+          <a:ln w="22225">
+            <a:solidFill>
+              <a:schemeClr val="tx1"/>
+            </a:solidFill>
+          </a:ln>
+        </p:spPr>
+        <p:style>
+          <a:lnRef idx="2">
+            <a:schemeClr val="accent1">
+              <a:shade val="50000"/>
+            </a:schemeClr>
+          </a:lnRef>
+          <a:fillRef idx="1">
+            <a:schemeClr val="accent1"/>
+          </a:fillRef>
+          <a:effectRef idx="0">
+            <a:schemeClr val="accent1"/>
+          </a:effectRef>
+          <a:fontRef idx="minor">
+            <a:schemeClr val="lt1"/>
+          </a:fontRef>
+        </p:style>
+        <p:txBody>
+          <a:bodyPr rtlCol="0" anchor="t" anchorCtr="0"/>
+          <a:lstStyle/>
+          <a:p>
+            <a:r>
+              <a:rPr lang="ro-MD" sz="1600" dirty="0">
+                <a:solidFill>
+                  <a:schemeClr val="tx1"/>
+                </a:solidFill>
+                <a:latin typeface="Consolas" panose="020B0609020204030204" pitchFamily="49" charset="0"/>
+              </a:rPr>
+              <a:t>$</a:t>
+            </a:r>
+            <a:r>
+              <a:rPr lang="ro-MD" sz="1600" dirty="0" smtClean="0">
+                <a:solidFill>
+                  <a:schemeClr val="tx1"/>
+                </a:solidFill>
+                <a:latin typeface="Consolas" panose="020B0609020204030204" pitchFamily="49" charset="0"/>
+              </a:rPr>
+              <a:t>2800</a:t>
+            </a:r>
+            <a:endParaRPr lang="en-US" sz="1600" dirty="0"/>
+          </a:p>
+        </p:txBody>
+      </p:sp>
+      <p:sp>
+        <p:nvSpPr>
+          <p:cNvPr id="12" name="Rectangle 11"/>
+          <p:cNvSpPr/>
+          <p:nvPr/>
+        </p:nvSpPr>
+        <p:spPr>
+          <a:xfrm>
+            <a:off x="6304148" y="1712422"/>
+            <a:ext cx="1512000" cy="1512000"/>
+          </a:xfrm>
+          <a:prstGeom prst="rect">
+            <a:avLst/>
+          </a:prstGeom>
+          <a:blipFill dpi="0" rotWithShape="1">
+            <a:blip r:embed="rId2">
+              <a:alphaModFix amt="50000"/>
+              <a:duotone>
+                <a:prstClr val="black"/>
+                <a:schemeClr val="accent1">
+                  <a:tint val="45000"/>
+                  <a:satMod val="400000"/>
+                </a:schemeClr>
+              </a:duotone>
+            </a:blip>
+            <a:srcRect/>
+            <a:stretch>
+              <a:fillRect/>
+            </a:stretch>
+          </a:blipFill>
+          <a:ln w="22225">
+            <a:solidFill>
+              <a:schemeClr val="tx1"/>
+            </a:solidFill>
+          </a:ln>
+        </p:spPr>
+        <p:style>
+          <a:lnRef idx="2">
+            <a:schemeClr val="accent1">
+              <a:shade val="50000"/>
+            </a:schemeClr>
+          </a:lnRef>
+          <a:fillRef idx="1">
+            <a:schemeClr val="accent1"/>
+          </a:fillRef>
+          <a:effectRef idx="0">
+            <a:schemeClr val="accent1"/>
+          </a:effectRef>
+          <a:fontRef idx="minor">
+            <a:schemeClr val="lt1"/>
+          </a:fontRef>
+        </p:style>
+        <p:txBody>
+          <a:bodyPr rtlCol="0" anchor="t" anchorCtr="0"/>
+          <a:lstStyle/>
+          <a:p>
+            <a:r>
+              <a:rPr lang="ro-MD" sz="1600" dirty="0">
+                <a:solidFill>
+                  <a:schemeClr val="tx1"/>
+                </a:solidFill>
+                <a:latin typeface="Consolas" panose="020B0609020204030204" pitchFamily="49" charset="0"/>
+              </a:rPr>
+              <a:t>$</a:t>
+            </a:r>
+            <a:r>
+              <a:rPr lang="ro-MD" sz="1600" dirty="0" smtClean="0">
+                <a:solidFill>
+                  <a:schemeClr val="tx1"/>
+                </a:solidFill>
+                <a:latin typeface="Consolas" panose="020B0609020204030204" pitchFamily="49" charset="0"/>
+              </a:rPr>
+              <a:t>2400</a:t>
+            </a:r>
+            <a:endParaRPr lang="en-US" sz="1600" dirty="0">
+              <a:solidFill>
+                <a:schemeClr val="tx1"/>
+              </a:solidFill>
+              <a:latin typeface="Consolas" panose="020B0609020204030204" pitchFamily="49" charset="0"/>
+            </a:endParaRPr>
+          </a:p>
+        </p:txBody>
+      </p:sp>
+      <p:sp>
+        <p:nvSpPr>
+          <p:cNvPr id="13" name="Rectangle 12"/>
+          <p:cNvSpPr/>
+          <p:nvPr/>
+        </p:nvSpPr>
+        <p:spPr>
+          <a:xfrm>
+            <a:off x="6304148" y="3228677"/>
+            <a:ext cx="1512000" cy="1512000"/>
+          </a:xfrm>
+          <a:prstGeom prst="rect">
+            <a:avLst/>
+          </a:prstGeom>
+          <a:blipFill dpi="0" rotWithShape="1">
+            <a:blip r:embed="rId2">
+              <a:alphaModFix amt="50000"/>
+              <a:duotone>
+                <a:prstClr val="black"/>
+                <a:schemeClr val="accent1">
+                  <a:tint val="45000"/>
+                  <a:satMod val="400000"/>
+                </a:schemeClr>
+              </a:duotone>
+            </a:blip>
+            <a:srcRect/>
+            <a:stretch>
+              <a:fillRect/>
+            </a:stretch>
+          </a:blipFill>
+          <a:ln w="22225">
+            <a:solidFill>
+              <a:schemeClr val="tx1"/>
+            </a:solidFill>
+          </a:ln>
+        </p:spPr>
+        <p:style>
+          <a:lnRef idx="2">
+            <a:schemeClr val="accent1">
+              <a:shade val="50000"/>
+            </a:schemeClr>
+          </a:lnRef>
+          <a:fillRef idx="1">
+            <a:schemeClr val="accent1"/>
+          </a:fillRef>
+          <a:effectRef idx="0">
+            <a:schemeClr val="accent1"/>
+          </a:effectRef>
+          <a:fontRef idx="minor">
+            <a:schemeClr val="lt1"/>
+          </a:fontRef>
+        </p:style>
+        <p:txBody>
+          <a:bodyPr rtlCol="0" anchor="t" anchorCtr="0"/>
+          <a:lstStyle/>
+          <a:p>
+            <a:r>
+              <a:rPr lang="ro-MD" sz="1600" dirty="0">
+                <a:solidFill>
+                  <a:schemeClr val="tx1"/>
+                </a:solidFill>
+                <a:latin typeface="Consolas" panose="020B0609020204030204" pitchFamily="49" charset="0"/>
+              </a:rPr>
+              <a:t>$</a:t>
+            </a:r>
+            <a:r>
+              <a:rPr lang="ro-MD" sz="1600" dirty="0" smtClean="0">
+                <a:solidFill>
+                  <a:schemeClr val="tx1"/>
+                </a:solidFill>
+                <a:latin typeface="Consolas" panose="020B0609020204030204" pitchFamily="49" charset="0"/>
+              </a:rPr>
+              <a:t>2C00</a:t>
+            </a:r>
+            <a:endParaRPr lang="en-US" sz="1600" dirty="0"/>
+          </a:p>
+        </p:txBody>
+      </p:sp>
+      <p:sp>
+        <p:nvSpPr>
+          <p:cNvPr id="14" name="TextBox 13"/>
+          <p:cNvSpPr txBox="1"/>
+          <p:nvPr/>
+        </p:nvSpPr>
+        <p:spPr>
+          <a:xfrm>
+            <a:off x="5126397" y="1914424"/>
+            <a:ext cx="843501" cy="1107996"/>
+          </a:xfrm>
+          <a:prstGeom prst="rect">
+            <a:avLst/>
+          </a:prstGeom>
+          <a:noFill/>
+        </p:spPr>
+        <p:txBody>
+          <a:bodyPr wrap="none" rtlCol="0">
+            <a:spAutoFit/>
+          </a:bodyPr>
+          <a:lstStyle/>
+          <a:p>
+            <a:r>
+              <a:rPr lang="ro-MD" sz="6600" dirty="0" smtClean="0">
+                <a:solidFill>
+                  <a:schemeClr val="bg1"/>
+                </a:solidFill>
+                <a:latin typeface="Arial Black" panose="020B0A04020102020204" pitchFamily="34" charset="0"/>
+              </a:rPr>
+              <a:t>A</a:t>
+            </a:r>
+            <a:endParaRPr lang="en-US" dirty="0">
+              <a:solidFill>
+                <a:schemeClr val="bg1"/>
+              </a:solidFill>
+              <a:latin typeface="Arial Black" panose="020B0A04020102020204" pitchFamily="34" charset="0"/>
+            </a:endParaRPr>
+          </a:p>
+        </p:txBody>
+      </p:sp>
+      <p:sp>
+        <p:nvSpPr>
+          <p:cNvPr id="15" name="TextBox 14"/>
+          <p:cNvSpPr txBox="1"/>
+          <p:nvPr/>
+        </p:nvSpPr>
+        <p:spPr>
+          <a:xfrm>
+            <a:off x="6638397" y="1914424"/>
+            <a:ext cx="843501" cy="1107996"/>
+          </a:xfrm>
+          <a:prstGeom prst="rect">
+            <a:avLst/>
+          </a:prstGeom>
+          <a:noFill/>
+        </p:spPr>
+        <p:txBody>
+          <a:bodyPr wrap="none" rtlCol="0">
+            <a:spAutoFit/>
+          </a:bodyPr>
+          <a:lstStyle/>
+          <a:p>
+            <a:r>
+              <a:rPr lang="ro-MD" sz="6600" dirty="0" smtClean="0">
+                <a:solidFill>
+                  <a:schemeClr val="bg1"/>
+                </a:solidFill>
+                <a:latin typeface="Arial Black" panose="020B0A04020102020204" pitchFamily="34" charset="0"/>
+              </a:rPr>
+              <a:t>A</a:t>
+            </a:r>
+            <a:endParaRPr lang="en-US" dirty="0">
+              <a:solidFill>
+                <a:schemeClr val="bg1"/>
+              </a:solidFill>
+              <a:latin typeface="Arial Black" panose="020B0A04020102020204" pitchFamily="34" charset="0"/>
+            </a:endParaRPr>
+          </a:p>
+        </p:txBody>
+      </p:sp>
+      <p:sp>
+        <p:nvSpPr>
+          <p:cNvPr id="16" name="TextBox 15"/>
+          <p:cNvSpPr txBox="1"/>
+          <p:nvPr/>
+        </p:nvSpPr>
+        <p:spPr>
+          <a:xfrm>
+            <a:off x="5126396" y="3426424"/>
+            <a:ext cx="843501" cy="1107996"/>
+          </a:xfrm>
+          <a:prstGeom prst="rect">
+            <a:avLst/>
+          </a:prstGeom>
+          <a:noFill/>
+        </p:spPr>
+        <p:txBody>
+          <a:bodyPr wrap="none" rtlCol="0">
+            <a:spAutoFit/>
+          </a:bodyPr>
+          <a:lstStyle/>
+          <a:p>
+            <a:r>
+              <a:rPr lang="ro-MD" sz="6600" dirty="0" smtClean="0">
+                <a:solidFill>
+                  <a:schemeClr val="bg1"/>
+                </a:solidFill>
+                <a:latin typeface="Arial Black" panose="020B0A04020102020204" pitchFamily="34" charset="0"/>
+              </a:rPr>
+              <a:t>A</a:t>
+            </a:r>
+            <a:endParaRPr lang="en-US" dirty="0">
+              <a:solidFill>
+                <a:schemeClr val="bg1"/>
+              </a:solidFill>
+              <a:latin typeface="Arial Black" panose="020B0A04020102020204" pitchFamily="34" charset="0"/>
+            </a:endParaRPr>
+          </a:p>
+        </p:txBody>
+      </p:sp>
+      <p:sp>
+        <p:nvSpPr>
+          <p:cNvPr id="17" name="TextBox 16"/>
+          <p:cNvSpPr txBox="1"/>
+          <p:nvPr/>
+        </p:nvSpPr>
+        <p:spPr>
+          <a:xfrm>
+            <a:off x="6638396" y="3426424"/>
+            <a:ext cx="843501" cy="1107996"/>
+          </a:xfrm>
+          <a:prstGeom prst="rect">
+            <a:avLst/>
+          </a:prstGeom>
+          <a:noFill/>
+        </p:spPr>
+        <p:txBody>
+          <a:bodyPr wrap="none" rtlCol="0">
+            <a:spAutoFit/>
+          </a:bodyPr>
+          <a:lstStyle/>
+          <a:p>
+            <a:r>
+              <a:rPr lang="ro-MD" sz="6600" dirty="0" smtClean="0">
+                <a:solidFill>
+                  <a:schemeClr val="bg1"/>
+                </a:solidFill>
+                <a:latin typeface="Arial Black" panose="020B0A04020102020204" pitchFamily="34" charset="0"/>
+              </a:rPr>
+              <a:t>A</a:t>
+            </a:r>
+            <a:endParaRPr lang="en-US" dirty="0">
+              <a:solidFill>
+                <a:schemeClr val="bg1"/>
+              </a:solidFill>
+              <a:latin typeface="Arial Black" panose="020B0A04020102020204" pitchFamily="34" charset="0"/>
+            </a:endParaRPr>
+          </a:p>
+        </p:txBody>
+      </p:sp>
+    </p:spTree>
+    <p:extLst>
+      <p:ext uri="{BB962C8B-B14F-4D97-AF65-F5344CB8AC3E}">
+        <p14:creationId xmlns:p14="http://schemas.microsoft.com/office/powerpoint/2010/main" val="2974765029"/>
       </p:ext>
     </p:extLst>
   </p:cSld>

</xml_diff>